<commit_message>
adding weighted activity selection slides
</commit_message>
<xml_diff>
--- a/slides/DP_activitySelect_Proof.pptx
+++ b/slides/DP_activitySelect_Proof.pptx
@@ -5,7 +5,7 @@
     <p:sldMasterId id="2147483660" r:id="rId1"/>
   </p:sldMasterIdLst>
   <p:notesMasterIdLst>
-    <p:notesMasterId r:id="rId10"/>
+    <p:notesMasterId r:id="rId25"/>
   </p:notesMasterIdLst>
   <p:sldIdLst>
     <p:sldId id="642" r:id="rId2"/>
@@ -16,6 +16,21 @@
     <p:sldId id="643" r:id="rId7"/>
     <p:sldId id="644" r:id="rId8"/>
     <p:sldId id="645" r:id="rId9"/>
+    <p:sldId id="325" r:id="rId10"/>
+    <p:sldId id="342" r:id="rId11"/>
+    <p:sldId id="353" r:id="rId12"/>
+    <p:sldId id="352" r:id="rId13"/>
+    <p:sldId id="395" r:id="rId14"/>
+    <p:sldId id="396" r:id="rId15"/>
+    <p:sldId id="397" r:id="rId16"/>
+    <p:sldId id="354" r:id="rId17"/>
+    <p:sldId id="356" r:id="rId18"/>
+    <p:sldId id="398" r:id="rId19"/>
+    <p:sldId id="357" r:id="rId20"/>
+    <p:sldId id="358" r:id="rId21"/>
+    <p:sldId id="399" r:id="rId22"/>
+    <p:sldId id="359" r:id="rId23"/>
+    <p:sldId id="360" r:id="rId24"/>
   </p:sldIdLst>
   <p:sldSz cx="12192000" cy="6858000"/>
   <p:notesSz cx="6858000" cy="9144000"/>
@@ -127,6 +142,21 @@
             <p14:sldId id="643"/>
             <p14:sldId id="644"/>
             <p14:sldId id="645"/>
+            <p14:sldId id="325"/>
+            <p14:sldId id="342"/>
+            <p14:sldId id="353"/>
+            <p14:sldId id="352"/>
+            <p14:sldId id="395"/>
+            <p14:sldId id="396"/>
+            <p14:sldId id="397"/>
+            <p14:sldId id="354"/>
+            <p14:sldId id="356"/>
+            <p14:sldId id="398"/>
+            <p14:sldId id="357"/>
+            <p14:sldId id="358"/>
+            <p14:sldId id="399"/>
+            <p14:sldId id="359"/>
+            <p14:sldId id="360"/>
           </p14:sldIdLst>
         </p14:section>
       </p14:sectionLst>
@@ -243,7 +273,7 @@
           <a:p>
             <a:fld id="{9A9F7FD5-2840-4607-A4CD-0A8A66D9D61D}" type="datetimeFigureOut">
               <a:rPr lang="en-US" smtClean="0"/>
-              <a:t>4/2/21</a:t>
+              <a:t>4/4/21</a:t>
             </a:fld>
             <a:endParaRPr lang="en-US"/>
           </a:p>
@@ -594,6 +624,112 @@
 </p:notes>
 </file>
 
+<file path=ppt/notesSlides/notesSlide2.xml><?xml version="1.0" encoding="utf-8"?>
+<p:notes xmlns:a="http://schemas.openxmlformats.org/drawingml/2006/main" xmlns:r="http://schemas.openxmlformats.org/officeDocument/2006/relationships" xmlns:p="http://schemas.openxmlformats.org/presentationml/2006/main">
+  <p:cSld>
+    <p:spTree>
+      <p:nvGrpSpPr>
+        <p:cNvPr id="1" name=""/>
+        <p:cNvGrpSpPr/>
+        <p:nvPr/>
+      </p:nvGrpSpPr>
+      <p:grpSpPr>
+        <a:xfrm>
+          <a:off x="0" y="0"/>
+          <a:ext cx="0" cy="0"/>
+          <a:chOff x="0" y="0"/>
+          <a:chExt cx="0" cy="0"/>
+        </a:xfrm>
+      </p:grpSpPr>
+      <p:sp>
+        <p:nvSpPr>
+          <p:cNvPr id="2" name="Slide Image Placeholder 1"/>
+          <p:cNvSpPr>
+            <a:spLocks noGrp="1" noRot="1" noChangeAspect="1"/>
+          </p:cNvSpPr>
+          <p:nvPr>
+            <p:ph type="sldImg"/>
+          </p:nvPr>
+        </p:nvSpPr>
+        <p:spPr/>
+      </p:sp>
+      <p:sp>
+        <p:nvSpPr>
+          <p:cNvPr id="3" name="Notes Placeholder 2"/>
+          <p:cNvSpPr>
+            <a:spLocks noGrp="1"/>
+          </p:cNvSpPr>
+          <p:nvPr>
+            <p:ph type="body" idx="1"/>
+          </p:nvPr>
+        </p:nvSpPr>
+        <p:spPr/>
+        <p:txBody>
+          <a:bodyPr/>
+          <a:lstStyle/>
+          <a:p>
+            <a:r>
+              <a:rPr lang="en-US" dirty="0"/>
+              <a:t>For any j, will generate recursive</a:t>
+            </a:r>
+            <a:r>
+              <a:rPr lang="en-US" baseline="0" dirty="0"/>
+              <a:t> calls on inputs of size j-1 and j-2.</a:t>
+            </a:r>
+          </a:p>
+          <a:p>
+            <a:r>
+              <a:rPr lang="en-US" baseline="0" dirty="0"/>
+              <a:t>Just like Fibonacci!</a:t>
+            </a:r>
+          </a:p>
+          <a:p>
+            <a:endParaRPr lang="en-US" dirty="0"/>
+          </a:p>
+        </p:txBody>
+      </p:sp>
+      <p:sp>
+        <p:nvSpPr>
+          <p:cNvPr id="4" name="Slide Number Placeholder 3"/>
+          <p:cNvSpPr>
+            <a:spLocks noGrp="1"/>
+          </p:cNvSpPr>
+          <p:nvPr>
+            <p:ph type="sldNum" sz="quarter" idx="10"/>
+          </p:nvPr>
+        </p:nvSpPr>
+        <p:spPr/>
+        <p:txBody>
+          <a:bodyPr/>
+          <a:lstStyle/>
+          <a:p>
+            <a:pPr>
+              <a:defRPr/>
+            </a:pPr>
+            <a:fld id="{F86876D7-A83B-4BB3-9AED-75488AD1A702}" type="slidenum">
+              <a:rPr lang="en-US" smtClean="0"/>
+              <a:pPr>
+                <a:defRPr/>
+              </a:pPr>
+              <a:t>19</a:t>
+            </a:fld>
+            <a:endParaRPr lang="en-US"/>
+          </a:p>
+        </p:txBody>
+      </p:sp>
+    </p:spTree>
+    <p:extLst>
+      <p:ext uri="{BB962C8B-B14F-4D97-AF65-F5344CB8AC3E}">
+        <p14:creationId xmlns:p14="http://schemas.microsoft.com/office/powerpoint/2010/main" val="2452760313"/>
+      </p:ext>
+    </p:extLst>
+  </p:cSld>
+  <p:clrMapOvr>
+    <a:masterClrMapping/>
+  </p:clrMapOvr>
+</p:notes>
+</file>
+
 <file path=ppt/slideLayouts/slideLayout1.xml><?xml version="1.0" encoding="utf-8"?>
 <p:sldLayout xmlns:a="http://schemas.openxmlformats.org/drawingml/2006/main" xmlns:r="http://schemas.openxmlformats.org/officeDocument/2006/relationships" xmlns:p="http://schemas.openxmlformats.org/presentationml/2006/main" type="title" preserve="1">
   <p:cSld name="Title Slide">
@@ -852,7 +988,7 @@
           <a:p>
             <a:fld id="{088A2421-D2CD-4522-A1BA-E4F59ED821B7}" type="datetime1">
               <a:rPr lang="en-US" smtClean="0"/>
-              <a:t>4/2/21</a:t>
+              <a:t>4/4/21</a:t>
             </a:fld>
             <a:endParaRPr lang="en-US"/>
           </a:p>
@@ -1127,7 +1263,7 @@
           <a:p>
             <a:fld id="{DA91928D-0C55-4D8D-9D16-4C05754E5356}" type="datetime1">
               <a:rPr lang="en-US" smtClean="0"/>
-              <a:t>4/2/21</a:t>
+              <a:t>4/4/21</a:t>
             </a:fld>
             <a:endParaRPr lang="en-US"/>
           </a:p>
@@ -1382,7 +1518,7 @@
           <a:p>
             <a:fld id="{584CEDDD-253B-4C38-A621-35D8BA950C17}" type="datetime1">
               <a:rPr lang="en-US" smtClean="0"/>
-              <a:t>4/2/21</a:t>
+              <a:t>4/4/21</a:t>
             </a:fld>
             <a:endParaRPr lang="en-US"/>
           </a:p>
@@ -1550,7 +1686,7 @@
           <a:p>
             <a:fld id="{BF0967E4-28CB-45C9-B82C-D6B22AD4F0EB}" type="datetime1">
               <a:rPr lang="en-US" smtClean="0"/>
-              <a:t>4/2/21</a:t>
+              <a:t>4/4/21</a:t>
             </a:fld>
             <a:endParaRPr lang="en-US"/>
           </a:p>
@@ -1728,7 +1864,7 @@
           <a:p>
             <a:fld id="{2454C693-B405-44E1-A127-B7CE8B45C1E1}" type="datetime1">
               <a:rPr lang="en-US" smtClean="0"/>
-              <a:t>4/2/21</a:t>
+              <a:t>4/4/21</a:t>
             </a:fld>
             <a:endParaRPr lang="en-US"/>
           </a:p>
@@ -1980,7 +2116,7 @@
           <a:p>
             <a:fld id="{26B28102-2E91-4DD7-8E8B-98B790A12701}" type="datetime1">
               <a:rPr lang="en-US" smtClean="0"/>
-              <a:t>4/2/21</a:t>
+              <a:t>4/4/21</a:t>
             </a:fld>
             <a:endParaRPr lang="en-US"/>
           </a:p>
@@ -2237,7 +2373,7 @@
           <a:p>
             <a:fld id="{0B5AF985-6D44-417A-9881-D208468CBA07}" type="datetime1">
               <a:rPr lang="en-US" smtClean="0"/>
-              <a:t>4/2/21</a:t>
+              <a:t>4/4/21</a:t>
             </a:fld>
             <a:endParaRPr lang="en-US"/>
           </a:p>
@@ -2494,7 +2630,7 @@
           <a:p>
             <a:fld id="{26B28102-2E91-4DD7-8E8B-98B790A12701}" type="datetime1">
               <a:rPr lang="en-US" smtClean="0"/>
-              <a:t>4/2/21</a:t>
+              <a:t>4/4/21</a:t>
             </a:fld>
             <a:endParaRPr lang="en-US"/>
           </a:p>
@@ -2740,7 +2876,7 @@
           <a:p>
             <a:fld id="{3A604A86-E8D2-4E57-8D6D-61E2D175474B}" type="datetime1">
               <a:rPr lang="en-US" smtClean="0"/>
-              <a:t>4/2/21</a:t>
+              <a:t>4/4/21</a:t>
             </a:fld>
             <a:endParaRPr lang="en-US"/>
           </a:p>
@@ -3103,7 +3239,7 @@
           <a:p>
             <a:fld id="{DC921DF3-1FB0-45DC-97EF-461960E13574}" type="datetime1">
               <a:rPr lang="en-US" smtClean="0"/>
-              <a:t>4/2/21</a:t>
+              <a:t>4/4/21</a:t>
             </a:fld>
             <a:endParaRPr lang="en-US"/>
           </a:p>
@@ -3595,7 +3731,7 @@
           <a:p>
             <a:fld id="{092B088E-2809-46D8-B43F-738015D878CC}" type="datetime1">
               <a:rPr lang="en-US" smtClean="0"/>
-              <a:t>4/2/21</a:t>
+              <a:t>4/4/21</a:t>
             </a:fld>
             <a:endParaRPr lang="en-US"/>
           </a:p>
@@ -3790,7 +3926,7 @@
           <a:p>
             <a:fld id="{8208D42A-BC08-426E-9E11-483BA9D61AF6}" type="datetime1">
               <a:rPr lang="en-US" smtClean="0"/>
-              <a:t>4/2/21</a:t>
+              <a:t>4/4/21</a:t>
             </a:fld>
             <a:endParaRPr lang="en-US"/>
           </a:p>
@@ -3990,7 +4126,7 @@
           <a:p>
             <a:fld id="{26B28102-2E91-4DD7-8E8B-98B790A12701}" type="datetime1">
               <a:rPr lang="en-US" smtClean="0"/>
-              <a:t>4/2/21</a:t>
+              <a:t>4/4/21</a:t>
             </a:fld>
             <a:endParaRPr lang="en-US"/>
           </a:p>
@@ -4086,7 +4222,7 @@
           <a:p>
             <a:fld id="{37D5C786-44E1-4BD5-AD14-75F3EA166B5A}" type="datetime1">
               <a:rPr lang="en-US" smtClean="0"/>
-              <a:t>4/2/21</a:t>
+              <a:t>4/4/21</a:t>
             </a:fld>
             <a:endParaRPr lang="en-US"/>
           </a:p>
@@ -4297,7 +4433,7 @@
           <a:p>
             <a:fld id="{26B28102-2E91-4DD7-8E8B-98B790A12701}" type="datetime1">
               <a:rPr lang="en-US" smtClean="0"/>
-              <a:t>4/2/21</a:t>
+              <a:t>4/4/21</a:t>
             </a:fld>
             <a:endParaRPr lang="en-US"/>
           </a:p>
@@ -4865,6 +5001,1608 @@
 </p:sld>
 </file>
 
+<file path=ppt/slides/slide10.xml><?xml version="1.0" encoding="utf-8"?>
+<p:sld xmlns:a="http://schemas.openxmlformats.org/drawingml/2006/main" xmlns:r="http://schemas.openxmlformats.org/officeDocument/2006/relationships" xmlns:p="http://schemas.openxmlformats.org/presentationml/2006/main">
+  <p:cSld>
+    <p:spTree>
+      <p:nvGrpSpPr>
+        <p:cNvPr id="1" name=""/>
+        <p:cNvGrpSpPr/>
+        <p:nvPr/>
+      </p:nvGrpSpPr>
+      <p:grpSpPr>
+        <a:xfrm>
+          <a:off x="0" y="0"/>
+          <a:ext cx="0" cy="0"/>
+          <a:chOff x="0" y="0"/>
+          <a:chExt cx="0" cy="0"/>
+        </a:xfrm>
+      </p:grpSpPr>
+      <p:sp>
+        <p:nvSpPr>
+          <p:cNvPr id="5" name="Title 4"/>
+          <p:cNvSpPr>
+            <a:spLocks noGrp="1"/>
+          </p:cNvSpPr>
+          <p:nvPr>
+            <p:ph type="title"/>
+          </p:nvPr>
+        </p:nvSpPr>
+        <p:spPr/>
+        <p:txBody>
+          <a:bodyPr/>
+          <a:lstStyle/>
+          <a:p>
+            <a:r>
+              <a:rPr lang="en-US"/>
+              <a:t>Weighted Interval Scheduling</a:t>
+            </a:r>
+            <a:endParaRPr lang="en-US" dirty="0"/>
+          </a:p>
+        </p:txBody>
+      </p:sp>
+      <p:sp>
+        <p:nvSpPr>
+          <p:cNvPr id="4" name="Slide Number Placeholder 3"/>
+          <p:cNvSpPr>
+            <a:spLocks noGrp="1"/>
+          </p:cNvSpPr>
+          <p:nvPr>
+            <p:ph type="sldNum" sz="quarter" idx="12"/>
+          </p:nvPr>
+        </p:nvSpPr>
+        <p:spPr/>
+        <p:txBody>
+          <a:bodyPr/>
+          <a:lstStyle/>
+          <a:p>
+            <a:pPr>
+              <a:defRPr/>
+            </a:pPr>
+            <a:fld id="{60EF4E3D-1597-46C5-8C28-5E04D40B97A3}" type="slidenum">
+              <a:rPr lang="en-US" smtClean="0"/>
+              <a:pPr>
+                <a:defRPr/>
+              </a:pPr>
+              <a:t>10</a:t>
+            </a:fld>
+            <a:endParaRPr lang="en-US"/>
+          </a:p>
+        </p:txBody>
+      </p:sp>
+      <p:sp>
+        <p:nvSpPr>
+          <p:cNvPr id="6" name="Content Placeholder 5"/>
+          <p:cNvSpPr>
+            <a:spLocks noGrp="1"/>
+          </p:cNvSpPr>
+          <p:nvPr>
+            <p:ph sz="quarter" idx="1"/>
+          </p:nvPr>
+        </p:nvSpPr>
+        <p:spPr/>
+        <p:txBody>
+          <a:bodyPr/>
+          <a:lstStyle/>
+          <a:p>
+            <a:r>
+              <a:rPr lang="en-US" dirty="0"/>
+              <a:t>Recall Interval Scheduling:</a:t>
+            </a:r>
+          </a:p>
+          <a:p>
+            <a:pPr lvl="1"/>
+            <a:r>
+              <a:rPr lang="en-US" dirty="0"/>
+              <a:t>Given a list of intervals pick a </a:t>
+            </a:r>
+            <a:r>
+              <a:rPr lang="en-US" i="1" dirty="0"/>
+              <a:t>schedule</a:t>
+            </a:r>
+            <a:r>
+              <a:rPr lang="en-US" dirty="0"/>
+              <a:t> of non-overlapping intervals that maximizes the number chosen</a:t>
+            </a:r>
+          </a:p>
+          <a:p>
+            <a:pPr lvl="2"/>
+            <a:r>
+              <a:rPr lang="en-US" dirty="0"/>
+              <a:t>i.e. each one has the same value</a:t>
+            </a:r>
+          </a:p>
+          <a:p>
+            <a:endParaRPr lang="en-US" dirty="0"/>
+          </a:p>
+          <a:p>
+            <a:r>
+              <a:rPr lang="en-US" dirty="0"/>
+              <a:t>Weighted interval scheduling is similar, but…</a:t>
+            </a:r>
+          </a:p>
+          <a:p>
+            <a:pPr lvl="1"/>
+            <a:r>
+              <a:rPr lang="en-US" dirty="0"/>
+              <a:t>Each interval has a different value</a:t>
+            </a:r>
+          </a:p>
+        </p:txBody>
+      </p:sp>
+    </p:spTree>
+    <p:extLst>
+      <p:ext uri="{BB962C8B-B14F-4D97-AF65-F5344CB8AC3E}">
+        <p14:creationId xmlns:p14="http://schemas.microsoft.com/office/powerpoint/2010/main" val="1032811644"/>
+      </p:ext>
+    </p:extLst>
+  </p:cSld>
+  <p:clrMapOvr>
+    <a:masterClrMapping/>
+  </p:clrMapOvr>
+</p:sld>
+</file>
+
+<file path=ppt/slides/slide11.xml><?xml version="1.0" encoding="utf-8"?>
+<p:sld xmlns:a="http://schemas.openxmlformats.org/drawingml/2006/main" xmlns:r="http://schemas.openxmlformats.org/officeDocument/2006/relationships" xmlns:p="http://schemas.openxmlformats.org/presentationml/2006/main">
+  <p:cSld>
+    <p:spTree>
+      <p:nvGrpSpPr>
+        <p:cNvPr id="1" name=""/>
+        <p:cNvGrpSpPr/>
+        <p:nvPr/>
+      </p:nvGrpSpPr>
+      <p:grpSpPr>
+        <a:xfrm>
+          <a:off x="0" y="0"/>
+          <a:ext cx="0" cy="0"/>
+          <a:chOff x="0" y="0"/>
+          <a:chExt cx="0" cy="0"/>
+        </a:xfrm>
+      </p:grpSpPr>
+      <p:sp>
+        <p:nvSpPr>
+          <p:cNvPr id="35843" name="Rectangle 2"/>
+          <p:cNvSpPr>
+            <a:spLocks noGrp="1" noChangeArrowheads="1"/>
+          </p:cNvSpPr>
+          <p:nvPr>
+            <p:ph type="title"/>
+          </p:nvPr>
+        </p:nvSpPr>
+        <p:spPr/>
+        <p:txBody>
+          <a:bodyPr>
+            <a:normAutofit/>
+          </a:bodyPr>
+          <a:lstStyle/>
+          <a:p>
+            <a:r>
+              <a:rPr lang="en-US" dirty="0"/>
+              <a:t>Greedy solution to interval scheduling</a:t>
+            </a:r>
+          </a:p>
+        </p:txBody>
+      </p:sp>
+      <p:sp>
+        <p:nvSpPr>
+          <p:cNvPr id="5" name="Slide Number Placeholder 4"/>
+          <p:cNvSpPr>
+            <a:spLocks noGrp="1"/>
+          </p:cNvSpPr>
+          <p:nvPr>
+            <p:ph type="sldNum" sz="quarter" idx="12"/>
+          </p:nvPr>
+        </p:nvSpPr>
+        <p:spPr/>
+        <p:txBody>
+          <a:bodyPr/>
+          <a:lstStyle/>
+          <a:p>
+            <a:fld id="{DACC1BBE-66B1-403A-8C7E-C57A0F3A107F}" type="slidenum">
+              <a:rPr lang="en-US" smtClean="0"/>
+              <a:pPr/>
+              <a:t>11</a:t>
+            </a:fld>
+            <a:endParaRPr lang="en-US"/>
+          </a:p>
+        </p:txBody>
+      </p:sp>
+      <p:sp>
+        <p:nvSpPr>
+          <p:cNvPr id="35844" name="Rectangle 3"/>
+          <p:cNvSpPr>
+            <a:spLocks noGrp="1" noChangeArrowheads="1"/>
+          </p:cNvSpPr>
+          <p:nvPr>
+            <p:ph sz="quarter" idx="1"/>
+          </p:nvPr>
+        </p:nvSpPr>
+        <p:spPr/>
+        <p:txBody>
+          <a:bodyPr>
+            <a:normAutofit lnSpcReduction="10000"/>
+          </a:bodyPr>
+          <a:lstStyle/>
+          <a:p>
+            <a:r>
+              <a:rPr lang="en-US" dirty="0"/>
+              <a:t>The algorithm:</a:t>
+            </a:r>
+          </a:p>
+          <a:p>
+            <a:pPr lvl="1"/>
+            <a:r>
+              <a:rPr lang="en-US" dirty="0"/>
+              <a:t>Sort the activities by finish time</a:t>
+            </a:r>
+          </a:p>
+          <a:p>
+            <a:pPr lvl="1"/>
+            <a:r>
+              <a:rPr lang="en-US" dirty="0"/>
+              <a:t>Schedule the first activity</a:t>
+            </a:r>
+          </a:p>
+          <a:p>
+            <a:pPr lvl="1"/>
+            <a:r>
+              <a:rPr lang="en-US" dirty="0"/>
+              <a:t>Then schedule the next activity in sorted list which starts after previous activity finishes</a:t>
+            </a:r>
+          </a:p>
+          <a:p>
+            <a:pPr lvl="1"/>
+            <a:r>
+              <a:rPr lang="en-US" dirty="0"/>
+              <a:t>Repeat until no more activities</a:t>
+            </a:r>
+          </a:p>
+          <a:p>
+            <a:endParaRPr lang="en-US" dirty="0"/>
+          </a:p>
+          <a:p>
+            <a:r>
+              <a:rPr lang="en-US" dirty="0"/>
+              <a:t>Intuition is even more simple:</a:t>
+            </a:r>
+          </a:p>
+          <a:p>
+            <a:pPr lvl="1"/>
+            <a:r>
+              <a:rPr lang="en-US" dirty="0"/>
+              <a:t>Always pick next activity that finishes earliest</a:t>
+            </a:r>
+          </a:p>
+        </p:txBody>
+      </p:sp>
+    </p:spTree>
+    <p:extLst>
+      <p:ext uri="{BB962C8B-B14F-4D97-AF65-F5344CB8AC3E}">
+        <p14:creationId xmlns:p14="http://schemas.microsoft.com/office/powerpoint/2010/main" val="603623255"/>
+      </p:ext>
+    </p:extLst>
+  </p:cSld>
+  <p:clrMapOvr>
+    <a:masterClrMapping/>
+  </p:clrMapOvr>
+</p:sld>
+</file>
+
+<file path=ppt/slides/slide12.xml><?xml version="1.0" encoding="utf-8"?>
+<p:sld xmlns:a="http://schemas.openxmlformats.org/drawingml/2006/main" xmlns:r="http://schemas.openxmlformats.org/officeDocument/2006/relationships" xmlns:p="http://schemas.openxmlformats.org/presentationml/2006/main">
+  <p:cSld>
+    <p:spTree>
+      <p:nvGrpSpPr>
+        <p:cNvPr id="1" name=""/>
+        <p:cNvGrpSpPr/>
+        <p:nvPr/>
+      </p:nvGrpSpPr>
+      <p:grpSpPr>
+        <a:xfrm>
+          <a:off x="0" y="0"/>
+          <a:ext cx="0" cy="0"/>
+          <a:chOff x="0" y="0"/>
+          <a:chExt cx="0" cy="0"/>
+        </a:xfrm>
+      </p:grpSpPr>
+      <p:sp>
+        <p:nvSpPr>
+          <p:cNvPr id="2" name="Title 1"/>
+          <p:cNvSpPr>
+            <a:spLocks noGrp="1"/>
+          </p:cNvSpPr>
+          <p:nvPr>
+            <p:ph type="title"/>
+          </p:nvPr>
+        </p:nvSpPr>
+        <p:spPr/>
+        <p:txBody>
+          <a:bodyPr/>
+          <a:lstStyle/>
+          <a:p>
+            <a:r>
+              <a:rPr lang="en-US"/>
+              <a:t>Greedy solution to the weighted version</a:t>
+            </a:r>
+            <a:endParaRPr lang="en-US" dirty="0"/>
+          </a:p>
+        </p:txBody>
+      </p:sp>
+      <p:sp>
+        <p:nvSpPr>
+          <p:cNvPr id="4" name="Slide Number Placeholder 3"/>
+          <p:cNvSpPr>
+            <a:spLocks noGrp="1"/>
+          </p:cNvSpPr>
+          <p:nvPr>
+            <p:ph type="sldNum" sz="quarter" idx="12"/>
+          </p:nvPr>
+        </p:nvSpPr>
+        <p:spPr/>
+        <p:txBody>
+          <a:bodyPr/>
+          <a:lstStyle/>
+          <a:p>
+            <a:fld id="{E17FA2C0-6470-4D29-AE9D-EE482BC8D0A3}" type="slidenum">
+              <a:rPr lang="en-US" smtClean="0"/>
+              <a:pPr/>
+              <a:t>12</a:t>
+            </a:fld>
+            <a:endParaRPr lang="en-US"/>
+          </a:p>
+        </p:txBody>
+      </p:sp>
+      <p:sp>
+        <p:nvSpPr>
+          <p:cNvPr id="3" name="Content Placeholder 2"/>
+          <p:cNvSpPr>
+            <a:spLocks noGrp="1"/>
+          </p:cNvSpPr>
+          <p:nvPr>
+            <p:ph sz="quarter" idx="1"/>
+          </p:nvPr>
+        </p:nvSpPr>
+        <p:spPr/>
+        <p:txBody>
+          <a:bodyPr>
+            <a:normAutofit fontScale="92500" lnSpcReduction="10000"/>
+          </a:bodyPr>
+          <a:lstStyle/>
+          <a:p>
+            <a:r>
+              <a:rPr lang="en-US" dirty="0"/>
+              <a:t>What would the greedy algorithm pick for this example?</a:t>
+            </a:r>
+          </a:p>
+          <a:p>
+            <a:r>
+              <a:rPr lang="en-US" dirty="0"/>
+              <a:t>And is that answer optimal?</a:t>
+            </a:r>
+          </a:p>
+          <a:p>
+            <a:endParaRPr lang="en-US" dirty="0"/>
+          </a:p>
+          <a:p>
+            <a:endParaRPr lang="en-US" dirty="0"/>
+          </a:p>
+          <a:p>
+            <a:endParaRPr lang="en-US" dirty="0"/>
+          </a:p>
+          <a:p>
+            <a:endParaRPr lang="en-US" dirty="0"/>
+          </a:p>
+          <a:p>
+            <a:endParaRPr lang="en-US" dirty="0"/>
+          </a:p>
+          <a:p>
+            <a:r>
+              <a:rPr lang="en-US" dirty="0"/>
+              <a:t>We can see that the greedy algorithm does not work for the weighted version</a:t>
+            </a:r>
+          </a:p>
+        </p:txBody>
+      </p:sp>
+      <p:pic>
+        <p:nvPicPr>
+          <p:cNvPr id="5" name="Picture 4" descr="kleinberg_06F01.gif                                            000C964AMacintosh HD                   BB9C66DE:"/>
+          <p:cNvPicPr>
+            <a:picLocks noChangeAspect="1" noChangeArrowheads="1"/>
+          </p:cNvPicPr>
+          <p:nvPr/>
+        </p:nvPicPr>
+        <p:blipFill>
+          <a:blip r:embed="rId2"/>
+          <a:srcRect b="18803"/>
+          <a:stretch>
+            <a:fillRect/>
+          </a:stretch>
+        </p:blipFill>
+        <p:spPr bwMode="auto">
+          <a:xfrm>
+            <a:off x="2057400" y="2971800"/>
+            <a:ext cx="7620000" cy="1981200"/>
+          </a:xfrm>
+          <a:prstGeom prst="rect">
+            <a:avLst/>
+          </a:prstGeom>
+          <a:noFill/>
+        </p:spPr>
+      </p:pic>
+    </p:spTree>
+    <p:extLst>
+      <p:ext uri="{BB962C8B-B14F-4D97-AF65-F5344CB8AC3E}">
+        <p14:creationId xmlns:p14="http://schemas.microsoft.com/office/powerpoint/2010/main" val="147259948"/>
+      </p:ext>
+    </p:extLst>
+  </p:cSld>
+  <p:clrMapOvr>
+    <a:masterClrMapping/>
+  </p:clrMapOvr>
+</p:sld>
+</file>
+
+<file path=ppt/slides/slide13.xml><?xml version="1.0" encoding="utf-8"?>
+<p:sld xmlns:a="http://schemas.openxmlformats.org/drawingml/2006/main" xmlns:r="http://schemas.openxmlformats.org/officeDocument/2006/relationships" xmlns:p="http://schemas.openxmlformats.org/presentationml/2006/main">
+  <p:cSld>
+    <p:spTree>
+      <p:nvGrpSpPr>
+        <p:cNvPr id="1" name=""/>
+        <p:cNvGrpSpPr/>
+        <p:nvPr/>
+      </p:nvGrpSpPr>
+      <p:grpSpPr>
+        <a:xfrm>
+          <a:off x="0" y="0"/>
+          <a:ext cx="0" cy="0"/>
+          <a:chOff x="0" y="0"/>
+          <a:chExt cx="0" cy="0"/>
+        </a:xfrm>
+      </p:grpSpPr>
+      <p:sp>
+        <p:nvSpPr>
+          <p:cNvPr id="2" name="Title 1"/>
+          <p:cNvSpPr>
+            <a:spLocks noGrp="1"/>
+          </p:cNvSpPr>
+          <p:nvPr>
+            <p:ph type="title"/>
+          </p:nvPr>
+        </p:nvSpPr>
+        <p:spPr/>
+        <p:txBody>
+          <a:bodyPr/>
+          <a:lstStyle/>
+          <a:p>
+            <a:r>
+              <a:rPr lang="en-US" dirty="0"/>
+              <a:t>Step 1</a:t>
+            </a:r>
+          </a:p>
+        </p:txBody>
+      </p:sp>
+      <p:sp>
+        <p:nvSpPr>
+          <p:cNvPr id="3" name="Slide Number Placeholder 2"/>
+          <p:cNvSpPr>
+            <a:spLocks noGrp="1"/>
+          </p:cNvSpPr>
+          <p:nvPr>
+            <p:ph type="sldNum" sz="quarter" idx="12"/>
+          </p:nvPr>
+        </p:nvSpPr>
+        <p:spPr/>
+        <p:txBody>
+          <a:bodyPr/>
+          <a:lstStyle/>
+          <a:p>
+            <a:pPr>
+              <a:defRPr/>
+            </a:pPr>
+            <a:fld id="{E17FA2C0-6470-4D29-AE9D-EE482BC8D0A3}" type="slidenum">
+              <a:rPr lang="en-US" smtClean="0"/>
+              <a:pPr>
+                <a:defRPr/>
+              </a:pPr>
+              <a:t>13</a:t>
+            </a:fld>
+            <a:endParaRPr lang="en-US"/>
+          </a:p>
+        </p:txBody>
+      </p:sp>
+      <p:sp>
+        <p:nvSpPr>
+          <p:cNvPr id="4" name="Content Placeholder 3"/>
+          <p:cNvSpPr>
+            <a:spLocks noGrp="1"/>
+          </p:cNvSpPr>
+          <p:nvPr>
+            <p:ph sz="quarter" idx="1"/>
+          </p:nvPr>
+        </p:nvSpPr>
+        <p:spPr/>
+        <p:txBody>
+          <a:bodyPr>
+            <a:normAutofit fontScale="85000" lnSpcReduction="20000"/>
+          </a:bodyPr>
+          <a:lstStyle/>
+          <a:p>
+            <a:r>
+              <a:rPr lang="en-US" dirty="0"/>
+              <a:t>Define the sub-problem</a:t>
+            </a:r>
+          </a:p>
+          <a:p>
+            <a:endParaRPr lang="en-US" dirty="0"/>
+          </a:p>
+          <a:p>
+            <a:r>
+              <a:rPr lang="en-US" dirty="0"/>
+              <a:t>This problem has optimal substructure, so let’s only consider intervals up to a certain point.</a:t>
+            </a:r>
+          </a:p>
+          <a:p>
+            <a:endParaRPr lang="en-US" dirty="0"/>
+          </a:p>
+          <a:p>
+            <a:r>
+              <a:rPr lang="en-US" dirty="0"/>
+              <a:t>Let Opt(j) be the solution to this problem when only considering intervals 1 through j</a:t>
+            </a:r>
+          </a:p>
+          <a:p>
+            <a:pPr lvl="1"/>
+            <a:r>
+              <a:rPr lang="en-US" dirty="0"/>
+              <a:t>How should we order the intervals? Does it matter? We will see soon that it does.</a:t>
+            </a:r>
+          </a:p>
+          <a:p>
+            <a:endParaRPr lang="en-US" dirty="0"/>
+          </a:p>
+          <a:p>
+            <a:r>
+              <a:rPr lang="en-US" dirty="0"/>
+              <a:t>Note that Opt(0) = 0</a:t>
+            </a:r>
+          </a:p>
+        </p:txBody>
+      </p:sp>
+    </p:spTree>
+    <p:extLst>
+      <p:ext uri="{BB962C8B-B14F-4D97-AF65-F5344CB8AC3E}">
+        <p14:creationId xmlns:p14="http://schemas.microsoft.com/office/powerpoint/2010/main" val="3989582418"/>
+      </p:ext>
+    </p:extLst>
+  </p:cSld>
+  <p:clrMapOvr>
+    <a:masterClrMapping/>
+  </p:clrMapOvr>
+</p:sld>
+</file>
+
+<file path=ppt/slides/slide14.xml><?xml version="1.0" encoding="utf-8"?>
+<p:sld xmlns:a="http://schemas.openxmlformats.org/drawingml/2006/main" xmlns:r="http://schemas.openxmlformats.org/officeDocument/2006/relationships" xmlns:p="http://schemas.openxmlformats.org/presentationml/2006/main">
+  <p:cSld>
+    <p:spTree>
+      <p:nvGrpSpPr>
+        <p:cNvPr id="1" name=""/>
+        <p:cNvGrpSpPr/>
+        <p:nvPr/>
+      </p:nvGrpSpPr>
+      <p:grpSpPr>
+        <a:xfrm>
+          <a:off x="0" y="0"/>
+          <a:ext cx="0" cy="0"/>
+          <a:chOff x="0" y="0"/>
+          <a:chExt cx="0" cy="0"/>
+        </a:xfrm>
+      </p:grpSpPr>
+      <p:sp>
+        <p:nvSpPr>
+          <p:cNvPr id="2" name="Title 1"/>
+          <p:cNvSpPr>
+            <a:spLocks noGrp="1"/>
+          </p:cNvSpPr>
+          <p:nvPr>
+            <p:ph type="title"/>
+          </p:nvPr>
+        </p:nvSpPr>
+        <p:spPr/>
+        <p:txBody>
+          <a:bodyPr/>
+          <a:lstStyle/>
+          <a:p>
+            <a:r>
+              <a:rPr lang="en-US" dirty="0"/>
+              <a:t>Step 2</a:t>
+            </a:r>
+          </a:p>
+        </p:txBody>
+      </p:sp>
+      <p:sp>
+        <p:nvSpPr>
+          <p:cNvPr id="3" name="Slide Number Placeholder 2"/>
+          <p:cNvSpPr>
+            <a:spLocks noGrp="1"/>
+          </p:cNvSpPr>
+          <p:nvPr>
+            <p:ph type="sldNum" sz="quarter" idx="12"/>
+          </p:nvPr>
+        </p:nvSpPr>
+        <p:spPr/>
+        <p:txBody>
+          <a:bodyPr/>
+          <a:lstStyle/>
+          <a:p>
+            <a:pPr>
+              <a:defRPr/>
+            </a:pPr>
+            <a:fld id="{E17FA2C0-6470-4D29-AE9D-EE482BC8D0A3}" type="slidenum">
+              <a:rPr lang="en-US" smtClean="0"/>
+              <a:pPr>
+                <a:defRPr/>
+              </a:pPr>
+              <a:t>14</a:t>
+            </a:fld>
+            <a:endParaRPr lang="en-US"/>
+          </a:p>
+        </p:txBody>
+      </p:sp>
+      <p:sp>
+        <p:nvSpPr>
+          <p:cNvPr id="4" name="Content Placeholder 3"/>
+          <p:cNvSpPr>
+            <a:spLocks noGrp="1"/>
+          </p:cNvSpPr>
+          <p:nvPr>
+            <p:ph sz="quarter" idx="1"/>
+          </p:nvPr>
+        </p:nvSpPr>
+        <p:spPr/>
+        <p:txBody>
+          <a:bodyPr>
+            <a:normAutofit/>
+          </a:bodyPr>
+          <a:lstStyle/>
+          <a:p>
+            <a:r>
+              <a:rPr lang="en-US" dirty="0"/>
+              <a:t>Define solution to problem in terms of sub-problems</a:t>
+            </a:r>
+          </a:p>
+          <a:p>
+            <a:endParaRPr lang="en-US" dirty="0"/>
+          </a:p>
+          <a:p>
+            <a:r>
+              <a:rPr lang="en-US" dirty="0"/>
+              <a:t>Base Case:</a:t>
+            </a:r>
+          </a:p>
+          <a:p>
+            <a:pPr lvl="1"/>
+            <a:r>
+              <a:rPr lang="en-US" dirty="0"/>
+              <a:t>Opt(0) = 0</a:t>
+            </a:r>
+          </a:p>
+          <a:p>
+            <a:pPr lvl="1"/>
+            <a:endParaRPr lang="en-US" dirty="0"/>
+          </a:p>
+          <a:p>
+            <a:r>
+              <a:rPr lang="en-US" dirty="0"/>
+              <a:t>Opt(j) = ?</a:t>
+            </a:r>
+          </a:p>
+        </p:txBody>
+      </p:sp>
+    </p:spTree>
+    <p:extLst>
+      <p:ext uri="{BB962C8B-B14F-4D97-AF65-F5344CB8AC3E}">
+        <p14:creationId xmlns:p14="http://schemas.microsoft.com/office/powerpoint/2010/main" val="2555489211"/>
+      </p:ext>
+    </p:extLst>
+  </p:cSld>
+  <p:clrMapOvr>
+    <a:masterClrMapping/>
+  </p:clrMapOvr>
+</p:sld>
+</file>
+
+<file path=ppt/slides/slide15.xml><?xml version="1.0" encoding="utf-8"?>
+<p:sld xmlns:a="http://schemas.openxmlformats.org/drawingml/2006/main" xmlns:r="http://schemas.openxmlformats.org/officeDocument/2006/relationships" xmlns:p="http://schemas.openxmlformats.org/presentationml/2006/main">
+  <p:cSld>
+    <p:spTree>
+      <p:nvGrpSpPr>
+        <p:cNvPr id="1" name=""/>
+        <p:cNvGrpSpPr/>
+        <p:nvPr/>
+      </p:nvGrpSpPr>
+      <p:grpSpPr>
+        <a:xfrm>
+          <a:off x="0" y="0"/>
+          <a:ext cx="0" cy="0"/>
+          <a:chOff x="0" y="0"/>
+          <a:chExt cx="0" cy="0"/>
+        </a:xfrm>
+      </p:grpSpPr>
+      <p:sp>
+        <p:nvSpPr>
+          <p:cNvPr id="2" name="Title 1"/>
+          <p:cNvSpPr>
+            <a:spLocks noGrp="1"/>
+          </p:cNvSpPr>
+          <p:nvPr>
+            <p:ph type="title"/>
+          </p:nvPr>
+        </p:nvSpPr>
+        <p:spPr/>
+        <p:txBody>
+          <a:bodyPr/>
+          <a:lstStyle/>
+          <a:p>
+            <a:r>
+              <a:rPr lang="en-US" dirty="0"/>
+              <a:t>Step 2</a:t>
+            </a:r>
+          </a:p>
+        </p:txBody>
+      </p:sp>
+      <p:sp>
+        <p:nvSpPr>
+          <p:cNvPr id="3" name="Slide Number Placeholder 2"/>
+          <p:cNvSpPr>
+            <a:spLocks noGrp="1"/>
+          </p:cNvSpPr>
+          <p:nvPr>
+            <p:ph type="sldNum" sz="quarter" idx="12"/>
+          </p:nvPr>
+        </p:nvSpPr>
+        <p:spPr/>
+        <p:txBody>
+          <a:bodyPr/>
+          <a:lstStyle/>
+          <a:p>
+            <a:pPr>
+              <a:defRPr/>
+            </a:pPr>
+            <a:fld id="{E17FA2C0-6470-4D29-AE9D-EE482BC8D0A3}" type="slidenum">
+              <a:rPr lang="en-US" smtClean="0"/>
+              <a:pPr>
+                <a:defRPr/>
+              </a:pPr>
+              <a:t>15</a:t>
+            </a:fld>
+            <a:endParaRPr lang="en-US"/>
+          </a:p>
+        </p:txBody>
+      </p:sp>
+      <p:sp>
+        <p:nvSpPr>
+          <p:cNvPr id="4" name="Content Placeholder 3"/>
+          <p:cNvSpPr>
+            <a:spLocks noGrp="1"/>
+          </p:cNvSpPr>
+          <p:nvPr>
+            <p:ph sz="quarter" idx="1"/>
+          </p:nvPr>
+        </p:nvSpPr>
+        <p:spPr/>
+        <p:txBody>
+          <a:bodyPr>
+            <a:normAutofit lnSpcReduction="10000"/>
+          </a:bodyPr>
+          <a:lstStyle/>
+          <a:p>
+            <a:r>
+              <a:rPr lang="en-US" dirty="0"/>
+              <a:t>Opt(j) = ?</a:t>
+            </a:r>
+          </a:p>
+          <a:p>
+            <a:endParaRPr lang="en-US" dirty="0"/>
+          </a:p>
+          <a:p>
+            <a:r>
+              <a:rPr lang="en-US" dirty="0"/>
+              <a:t>Two cases:</a:t>
+            </a:r>
+          </a:p>
+          <a:p>
+            <a:pPr lvl="1"/>
+            <a:r>
+              <a:rPr lang="en-US" dirty="0"/>
+              <a:t>Interval j is not in the optimal solution</a:t>
+            </a:r>
+          </a:p>
+          <a:p>
+            <a:pPr lvl="2"/>
+            <a:r>
+              <a:rPr lang="en-US" dirty="0"/>
+              <a:t>Opt(j) = Opt(j-1) //same solution, because j interval doesn’t matter</a:t>
+            </a:r>
+          </a:p>
+          <a:p>
+            <a:pPr lvl="2"/>
+            <a:endParaRPr lang="en-US" dirty="0"/>
+          </a:p>
+          <a:p>
+            <a:pPr lvl="1"/>
+            <a:r>
+              <a:rPr lang="en-US" dirty="0"/>
+              <a:t>Interval j is in the optimal solution</a:t>
+            </a:r>
+          </a:p>
+          <a:p>
+            <a:pPr lvl="2"/>
+            <a:r>
+              <a:rPr lang="en-US" dirty="0"/>
+              <a:t>Opt(j) = </a:t>
+            </a:r>
+            <a:r>
+              <a:rPr lang="en-US" dirty="0" err="1"/>
+              <a:t>Vj</a:t>
+            </a:r>
+            <a:r>
+              <a:rPr lang="en-US" dirty="0"/>
+              <a:t> + Opt(intervals compatible with j)</a:t>
+            </a:r>
+          </a:p>
+          <a:p>
+            <a:pPr lvl="2"/>
+            <a:r>
+              <a:rPr lang="en-US" dirty="0"/>
+              <a:t>Intervals compatible with j? Yikes? How do we calculate that?</a:t>
+            </a:r>
+          </a:p>
+        </p:txBody>
+      </p:sp>
+    </p:spTree>
+    <p:extLst>
+      <p:ext uri="{BB962C8B-B14F-4D97-AF65-F5344CB8AC3E}">
+        <p14:creationId xmlns:p14="http://schemas.microsoft.com/office/powerpoint/2010/main" val="1242911452"/>
+      </p:ext>
+    </p:extLst>
+  </p:cSld>
+  <p:clrMapOvr>
+    <a:masterClrMapping/>
+  </p:clrMapOvr>
+</p:sld>
+</file>
+
+<file path=ppt/slides/slide16.xml><?xml version="1.0" encoding="utf-8"?>
+<p:sld xmlns:a="http://schemas.openxmlformats.org/drawingml/2006/main" xmlns:r="http://schemas.openxmlformats.org/officeDocument/2006/relationships" xmlns:p="http://schemas.openxmlformats.org/presentationml/2006/main">
+  <p:cSld>
+    <p:spTree>
+      <p:nvGrpSpPr>
+        <p:cNvPr id="1" name=""/>
+        <p:cNvGrpSpPr/>
+        <p:nvPr/>
+      </p:nvGrpSpPr>
+      <p:grpSpPr>
+        <a:xfrm>
+          <a:off x="0" y="0"/>
+          <a:ext cx="0" cy="0"/>
+          <a:chOff x="0" y="0"/>
+          <a:chExt cx="0" cy="0"/>
+        </a:xfrm>
+      </p:grpSpPr>
+      <p:sp>
+        <p:nvSpPr>
+          <p:cNvPr id="2" name="Title 1"/>
+          <p:cNvSpPr>
+            <a:spLocks noGrp="1"/>
+          </p:cNvSpPr>
+          <p:nvPr>
+            <p:ph type="title"/>
+          </p:nvPr>
+        </p:nvSpPr>
+        <p:spPr/>
+        <p:txBody>
+          <a:bodyPr>
+            <a:normAutofit/>
+          </a:bodyPr>
+          <a:lstStyle/>
+          <a:p>
+            <a:r>
+              <a:rPr lang="en-US" dirty="0"/>
+              <a:t>Calculating Opt(j)</a:t>
+            </a:r>
+          </a:p>
+        </p:txBody>
+      </p:sp>
+      <p:sp>
+        <p:nvSpPr>
+          <p:cNvPr id="4" name="Slide Number Placeholder 3"/>
+          <p:cNvSpPr>
+            <a:spLocks noGrp="1"/>
+          </p:cNvSpPr>
+          <p:nvPr>
+            <p:ph type="sldNum" sz="quarter" idx="12"/>
+          </p:nvPr>
+        </p:nvSpPr>
+        <p:spPr/>
+        <p:txBody>
+          <a:bodyPr/>
+          <a:lstStyle/>
+          <a:p>
+            <a:pPr>
+              <a:defRPr/>
+            </a:pPr>
+            <a:fld id="{E17FA2C0-6470-4D29-AE9D-EE482BC8D0A3}" type="slidenum">
+              <a:rPr lang="en-US" smtClean="0"/>
+              <a:pPr>
+                <a:defRPr/>
+              </a:pPr>
+              <a:t>16</a:t>
+            </a:fld>
+            <a:endParaRPr lang="en-US"/>
+          </a:p>
+        </p:txBody>
+      </p:sp>
+      <p:sp>
+        <p:nvSpPr>
+          <p:cNvPr id="3" name="Content Placeholder 2"/>
+          <p:cNvSpPr>
+            <a:spLocks noGrp="1"/>
+          </p:cNvSpPr>
+          <p:nvPr>
+            <p:ph sz="quarter" idx="1"/>
+          </p:nvPr>
+        </p:nvSpPr>
+        <p:spPr/>
+        <p:txBody>
+          <a:bodyPr>
+            <a:normAutofit fontScale="85000" lnSpcReduction="20000"/>
+          </a:bodyPr>
+          <a:lstStyle/>
+          <a:p>
+            <a:r>
+              <a:rPr lang="en-US" dirty="0"/>
+              <a:t>Sort all intervals by their finish time</a:t>
+            </a:r>
+          </a:p>
+          <a:p>
+            <a:pPr lvl="1"/>
+            <a:r>
+              <a:rPr lang="en-US" dirty="0"/>
+              <a:t>And number them sequentially</a:t>
+            </a:r>
+          </a:p>
+          <a:p>
+            <a:pPr lvl="1"/>
+            <a:endParaRPr lang="en-US" dirty="0"/>
+          </a:p>
+          <a:p>
+            <a:r>
+              <a:rPr lang="en-US" dirty="0"/>
+              <a:t>We define interval </a:t>
+            </a:r>
+            <a:r>
+              <a:rPr lang="en-US" dirty="0" err="1"/>
+              <a:t>i</a:t>
+            </a:r>
+            <a:r>
+              <a:rPr lang="en-US" dirty="0"/>
+              <a:t> is less than interval j if </a:t>
+            </a:r>
+            <a:r>
+              <a:rPr lang="en-US" dirty="0" err="1"/>
+              <a:t>i</a:t>
+            </a:r>
+            <a:r>
+              <a:rPr lang="en-US" dirty="0"/>
+              <a:t> finishes before j (i.e. is before it in the sort)</a:t>
+            </a:r>
+          </a:p>
+          <a:p>
+            <a:endParaRPr lang="en-US" dirty="0"/>
+          </a:p>
+          <a:p>
+            <a:r>
+              <a:rPr lang="en-US" dirty="0"/>
+              <a:t>Define p(j) to be the highest numbered interval </a:t>
+            </a:r>
+            <a:r>
+              <a:rPr lang="en-US" dirty="0" err="1"/>
+              <a:t>i</a:t>
+            </a:r>
+            <a:r>
+              <a:rPr lang="en-US" dirty="0"/>
+              <a:t>&lt;j such that </a:t>
+            </a:r>
+            <a:r>
+              <a:rPr lang="en-US" dirty="0" err="1"/>
+              <a:t>i</a:t>
+            </a:r>
+            <a:r>
+              <a:rPr lang="en-US" dirty="0"/>
+              <a:t> and j are disjoint</a:t>
+            </a:r>
+          </a:p>
+          <a:p>
+            <a:endParaRPr lang="en-US" dirty="0"/>
+          </a:p>
+          <a:p>
+            <a:r>
+              <a:rPr lang="en-US" dirty="0"/>
+              <a:t>Define OPT(j) to be the value of an optimal solution for intervals 1 through j only</a:t>
+            </a:r>
+          </a:p>
+        </p:txBody>
+      </p:sp>
+    </p:spTree>
+    <p:extLst>
+      <p:ext uri="{BB962C8B-B14F-4D97-AF65-F5344CB8AC3E}">
+        <p14:creationId xmlns:p14="http://schemas.microsoft.com/office/powerpoint/2010/main" val="362990065"/>
+      </p:ext>
+    </p:extLst>
+  </p:cSld>
+  <p:clrMapOvr>
+    <a:masterClrMapping/>
+  </p:clrMapOvr>
+</p:sld>
+</file>
+
+<file path=ppt/slides/slide17.xml><?xml version="1.0" encoding="utf-8"?>
+<p:sld xmlns:a="http://schemas.openxmlformats.org/drawingml/2006/main" xmlns:r="http://schemas.openxmlformats.org/officeDocument/2006/relationships" xmlns:p="http://schemas.openxmlformats.org/presentationml/2006/main">
+  <p:cSld>
+    <p:spTree>
+      <p:nvGrpSpPr>
+        <p:cNvPr id="1" name=""/>
+        <p:cNvGrpSpPr/>
+        <p:nvPr/>
+      </p:nvGrpSpPr>
+      <p:grpSpPr>
+        <a:xfrm>
+          <a:off x="0" y="0"/>
+          <a:ext cx="0" cy="0"/>
+          <a:chOff x="0" y="0"/>
+          <a:chExt cx="0" cy="0"/>
+        </a:xfrm>
+      </p:grpSpPr>
+      <p:sp>
+        <p:nvSpPr>
+          <p:cNvPr id="2" name="Title 1"/>
+          <p:cNvSpPr>
+            <a:spLocks noGrp="1"/>
+          </p:cNvSpPr>
+          <p:nvPr>
+            <p:ph type="title"/>
+          </p:nvPr>
+        </p:nvSpPr>
+        <p:spPr/>
+        <p:txBody>
+          <a:bodyPr/>
+          <a:lstStyle/>
+          <a:p>
+            <a:r>
+              <a:rPr lang="en-US" dirty="0"/>
+              <a:t>Showing p(j)</a:t>
+            </a:r>
+          </a:p>
+        </p:txBody>
+      </p:sp>
+      <p:sp>
+        <p:nvSpPr>
+          <p:cNvPr id="4" name="Slide Number Placeholder 3"/>
+          <p:cNvSpPr>
+            <a:spLocks noGrp="1"/>
+          </p:cNvSpPr>
+          <p:nvPr>
+            <p:ph type="sldNum" sz="quarter" idx="12"/>
+          </p:nvPr>
+        </p:nvSpPr>
+        <p:spPr/>
+        <p:txBody>
+          <a:bodyPr/>
+          <a:lstStyle/>
+          <a:p>
+            <a:pPr>
+              <a:defRPr/>
+            </a:pPr>
+            <a:fld id="{E17FA2C0-6470-4D29-AE9D-EE482BC8D0A3}" type="slidenum">
+              <a:rPr lang="en-US" smtClean="0"/>
+              <a:pPr>
+                <a:defRPr/>
+              </a:pPr>
+              <a:t>17</a:t>
+            </a:fld>
+            <a:endParaRPr lang="en-US"/>
+          </a:p>
+        </p:txBody>
+      </p:sp>
+      <p:pic>
+        <p:nvPicPr>
+          <p:cNvPr id="5" name="Picture 2" descr="C:\WINDOWS\Desktop\Oh_type\kleinberg_GIF_01to10\kleinberg_06F02.gif"/>
+          <p:cNvPicPr preferRelativeResize="0">
+            <a:picLocks noChangeAspect="1" noChangeArrowheads="1"/>
+          </p:cNvPicPr>
+          <p:nvPr>
+            <p:custDataLst>
+              <p:tags r:id="rId1"/>
+            </p:custDataLst>
+          </p:nvPr>
+        </p:nvPicPr>
+        <p:blipFill>
+          <a:blip r:embed="rId3"/>
+          <a:srcRect b="13002"/>
+          <a:stretch>
+            <a:fillRect/>
+          </a:stretch>
+        </p:blipFill>
+        <p:spPr bwMode="auto">
+          <a:xfrm>
+            <a:off x="2286000" y="2133600"/>
+            <a:ext cx="7620000" cy="3505200"/>
+          </a:xfrm>
+          <a:prstGeom prst="rect">
+            <a:avLst/>
+          </a:prstGeom>
+          <a:noFill/>
+          <a:ln w="9525">
+            <a:noFill/>
+            <a:miter lim="800000"/>
+            <a:headEnd/>
+            <a:tailEnd/>
+          </a:ln>
+          <a:effectLst/>
+        </p:spPr>
+      </p:pic>
+    </p:spTree>
+    <p:extLst>
+      <p:ext uri="{BB962C8B-B14F-4D97-AF65-F5344CB8AC3E}">
+        <p14:creationId xmlns:p14="http://schemas.microsoft.com/office/powerpoint/2010/main" val="90115083"/>
+      </p:ext>
+    </p:extLst>
+  </p:cSld>
+  <p:clrMapOvr>
+    <a:masterClrMapping/>
+  </p:clrMapOvr>
+</p:sld>
+</file>
+
+<file path=ppt/slides/slide18.xml><?xml version="1.0" encoding="utf-8"?>
+<p:sld xmlns:a="http://schemas.openxmlformats.org/drawingml/2006/main" xmlns:r="http://schemas.openxmlformats.org/officeDocument/2006/relationships" xmlns:p="http://schemas.openxmlformats.org/presentationml/2006/main">
+  <p:cSld>
+    <p:spTree>
+      <p:nvGrpSpPr>
+        <p:cNvPr id="1" name=""/>
+        <p:cNvGrpSpPr/>
+        <p:nvPr/>
+      </p:nvGrpSpPr>
+      <p:grpSpPr>
+        <a:xfrm>
+          <a:off x="0" y="0"/>
+          <a:ext cx="0" cy="0"/>
+          <a:chOff x="0" y="0"/>
+          <a:chExt cx="0" cy="0"/>
+        </a:xfrm>
+      </p:grpSpPr>
+      <p:sp>
+        <p:nvSpPr>
+          <p:cNvPr id="2" name="Title 1"/>
+          <p:cNvSpPr>
+            <a:spLocks noGrp="1"/>
+          </p:cNvSpPr>
+          <p:nvPr>
+            <p:ph type="title"/>
+          </p:nvPr>
+        </p:nvSpPr>
+        <p:spPr/>
+        <p:txBody>
+          <a:bodyPr/>
+          <a:lstStyle/>
+          <a:p>
+            <a:r>
+              <a:rPr lang="en-US" dirty="0"/>
+              <a:t>Step 2</a:t>
+            </a:r>
+          </a:p>
+        </p:txBody>
+      </p:sp>
+      <p:sp>
+        <p:nvSpPr>
+          <p:cNvPr id="3" name="Slide Number Placeholder 2"/>
+          <p:cNvSpPr>
+            <a:spLocks noGrp="1"/>
+          </p:cNvSpPr>
+          <p:nvPr>
+            <p:ph type="sldNum" sz="quarter" idx="12"/>
+          </p:nvPr>
+        </p:nvSpPr>
+        <p:spPr/>
+        <p:txBody>
+          <a:bodyPr/>
+          <a:lstStyle/>
+          <a:p>
+            <a:pPr>
+              <a:defRPr/>
+            </a:pPr>
+            <a:fld id="{E17FA2C0-6470-4D29-AE9D-EE482BC8D0A3}" type="slidenum">
+              <a:rPr lang="en-US" smtClean="0"/>
+              <a:pPr>
+                <a:defRPr/>
+              </a:pPr>
+              <a:t>18</a:t>
+            </a:fld>
+            <a:endParaRPr lang="en-US"/>
+          </a:p>
+        </p:txBody>
+      </p:sp>
+      <p:sp>
+        <p:nvSpPr>
+          <p:cNvPr id="4" name="Content Placeholder 3"/>
+          <p:cNvSpPr>
+            <a:spLocks noGrp="1"/>
+          </p:cNvSpPr>
+          <p:nvPr>
+            <p:ph sz="quarter" idx="1"/>
+          </p:nvPr>
+        </p:nvSpPr>
+        <p:spPr/>
+        <p:txBody>
+          <a:bodyPr>
+            <a:normAutofit fontScale="92500" lnSpcReduction="20000"/>
+          </a:bodyPr>
+          <a:lstStyle/>
+          <a:p>
+            <a:r>
+              <a:rPr lang="en-US" dirty="0"/>
+              <a:t>Opt(j) = ?</a:t>
+            </a:r>
+          </a:p>
+          <a:p>
+            <a:endParaRPr lang="en-US" dirty="0"/>
+          </a:p>
+          <a:p>
+            <a:r>
+              <a:rPr lang="en-US" dirty="0"/>
+              <a:t>Two cases:</a:t>
+            </a:r>
+          </a:p>
+          <a:p>
+            <a:pPr lvl="1"/>
+            <a:r>
+              <a:rPr lang="en-US" dirty="0"/>
+              <a:t>Interval j is not in the optimal solution</a:t>
+            </a:r>
+          </a:p>
+          <a:p>
+            <a:pPr lvl="2"/>
+            <a:r>
+              <a:rPr lang="en-US" dirty="0"/>
+              <a:t>Opt(j) = </a:t>
+            </a:r>
+            <a:r>
+              <a:rPr lang="en-US" dirty="0">
+                <a:solidFill>
+                  <a:srgbClr val="0070C0"/>
+                </a:solidFill>
+              </a:rPr>
+              <a:t>Opt(j-1)</a:t>
+            </a:r>
+            <a:r>
+              <a:rPr lang="en-US" dirty="0"/>
+              <a:t> //same solution, because j interval doesn’t matter</a:t>
+            </a:r>
+          </a:p>
+          <a:p>
+            <a:pPr lvl="2"/>
+            <a:endParaRPr lang="en-US" dirty="0"/>
+          </a:p>
+          <a:p>
+            <a:pPr lvl="1"/>
+            <a:r>
+              <a:rPr lang="en-US" dirty="0"/>
+              <a:t>Interval j is in the optimal solution</a:t>
+            </a:r>
+          </a:p>
+          <a:p>
+            <a:pPr lvl="2"/>
+            <a:r>
+              <a:rPr lang="en-US" dirty="0"/>
+              <a:t>Opt(j) = </a:t>
+            </a:r>
+            <a:r>
+              <a:rPr lang="en-US" dirty="0" err="1">
+                <a:solidFill>
+                  <a:srgbClr val="33CC33"/>
+                </a:solidFill>
+              </a:rPr>
+              <a:t>Vj</a:t>
+            </a:r>
+            <a:r>
+              <a:rPr lang="en-US" dirty="0">
+                <a:solidFill>
+                  <a:srgbClr val="33CC33"/>
+                </a:solidFill>
+              </a:rPr>
+              <a:t> + Opt(p(j))</a:t>
+            </a:r>
+          </a:p>
+          <a:p>
+            <a:pPr lvl="2"/>
+            <a:endParaRPr lang="en-US" dirty="0"/>
+          </a:p>
+          <a:p>
+            <a:pPr lvl="1"/>
+            <a:r>
+              <a:rPr lang="en-US" dirty="0"/>
+              <a:t>So…we have</a:t>
+            </a:r>
+          </a:p>
+          <a:p>
+            <a:pPr lvl="2"/>
+            <a:r>
+              <a:rPr lang="en-US" dirty="0"/>
+              <a:t>Opt(j) = Max( </a:t>
+            </a:r>
+            <a:r>
+              <a:rPr lang="en-US" dirty="0">
+                <a:solidFill>
+                  <a:srgbClr val="0070C0"/>
+                </a:solidFill>
+              </a:rPr>
+              <a:t>Opt(j-1)</a:t>
+            </a:r>
+            <a:r>
+              <a:rPr lang="en-US" dirty="0"/>
+              <a:t>, </a:t>
+            </a:r>
+            <a:r>
+              <a:rPr lang="en-US" dirty="0" err="1">
+                <a:solidFill>
+                  <a:srgbClr val="33CC33"/>
+                </a:solidFill>
+              </a:rPr>
+              <a:t>Vj</a:t>
+            </a:r>
+            <a:r>
+              <a:rPr lang="en-US" dirty="0">
+                <a:solidFill>
+                  <a:srgbClr val="33CC33"/>
+                </a:solidFill>
+              </a:rPr>
+              <a:t> + Opt(p(j)) </a:t>
+            </a:r>
+            <a:r>
+              <a:rPr lang="en-US" dirty="0"/>
+              <a:t>)</a:t>
+            </a:r>
+          </a:p>
+        </p:txBody>
+      </p:sp>
+    </p:spTree>
+    <p:extLst>
+      <p:ext uri="{BB962C8B-B14F-4D97-AF65-F5344CB8AC3E}">
+        <p14:creationId xmlns:p14="http://schemas.microsoft.com/office/powerpoint/2010/main" val="286095899"/>
+      </p:ext>
+    </p:extLst>
+  </p:cSld>
+  <p:clrMapOvr>
+    <a:masterClrMapping/>
+  </p:clrMapOvr>
+</p:sld>
+</file>
+
+<file path=ppt/slides/slide19.xml><?xml version="1.0" encoding="utf-8"?>
+<p:sld xmlns:a="http://schemas.openxmlformats.org/drawingml/2006/main" xmlns:r="http://schemas.openxmlformats.org/officeDocument/2006/relationships" xmlns:p="http://schemas.openxmlformats.org/presentationml/2006/main">
+  <p:cSld>
+    <p:spTree>
+      <p:nvGrpSpPr>
+        <p:cNvPr id="1" name=""/>
+        <p:cNvGrpSpPr/>
+        <p:nvPr/>
+      </p:nvGrpSpPr>
+      <p:grpSpPr>
+        <a:xfrm>
+          <a:off x="0" y="0"/>
+          <a:ext cx="0" cy="0"/>
+          <a:chOff x="0" y="0"/>
+          <a:chExt cx="0" cy="0"/>
+        </a:xfrm>
+      </p:grpSpPr>
+      <p:sp>
+        <p:nvSpPr>
+          <p:cNvPr id="2" name="Title 1"/>
+          <p:cNvSpPr>
+            <a:spLocks noGrp="1"/>
+          </p:cNvSpPr>
+          <p:nvPr>
+            <p:ph type="title"/>
+          </p:nvPr>
+        </p:nvSpPr>
+        <p:spPr/>
+        <p:txBody>
+          <a:bodyPr/>
+          <a:lstStyle/>
+          <a:p>
+            <a:r>
+              <a:rPr lang="en-US" dirty="0"/>
+              <a:t>Recursive solution</a:t>
+            </a:r>
+          </a:p>
+        </p:txBody>
+      </p:sp>
+      <p:sp>
+        <p:nvSpPr>
+          <p:cNvPr id="4" name="Slide Number Placeholder 3"/>
+          <p:cNvSpPr>
+            <a:spLocks noGrp="1"/>
+          </p:cNvSpPr>
+          <p:nvPr>
+            <p:ph type="sldNum" sz="quarter" idx="12"/>
+          </p:nvPr>
+        </p:nvSpPr>
+        <p:spPr/>
+        <p:txBody>
+          <a:bodyPr/>
+          <a:lstStyle/>
+          <a:p>
+            <a:pPr>
+              <a:defRPr/>
+            </a:pPr>
+            <a:fld id="{E17FA2C0-6470-4D29-AE9D-EE482BC8D0A3}" type="slidenum">
+              <a:rPr lang="en-US" smtClean="0"/>
+              <a:pPr>
+                <a:defRPr/>
+              </a:pPr>
+              <a:t>19</a:t>
+            </a:fld>
+            <a:endParaRPr lang="en-US"/>
+          </a:p>
+        </p:txBody>
+      </p:sp>
+      <p:sp>
+        <p:nvSpPr>
+          <p:cNvPr id="3" name="Content Placeholder 2"/>
+          <p:cNvSpPr>
+            <a:spLocks noGrp="1"/>
+          </p:cNvSpPr>
+          <p:nvPr>
+            <p:ph sz="quarter" idx="1"/>
+          </p:nvPr>
+        </p:nvSpPr>
+        <p:spPr>
+          <a:xfrm>
+            <a:off x="609600" y="1219201"/>
+            <a:ext cx="10972800" cy="3581399"/>
+          </a:xfrm>
+        </p:spPr>
+        <p:txBody>
+          <a:bodyPr>
+            <a:normAutofit/>
+          </a:bodyPr>
+          <a:lstStyle/>
+          <a:p>
+            <a:r>
+              <a:rPr lang="en-US" sz="2800" dirty="0"/>
+              <a:t>OPT(j) = max(</a:t>
+            </a:r>
+            <a:r>
+              <a:rPr lang="en-US" sz="2800" dirty="0" err="1">
+                <a:solidFill>
+                  <a:srgbClr val="33CC33"/>
+                </a:solidFill>
+              </a:rPr>
+              <a:t>v</a:t>
+            </a:r>
+            <a:r>
+              <a:rPr lang="en-US" sz="2800" baseline="-25000" dirty="0" err="1">
+                <a:solidFill>
+                  <a:srgbClr val="33CC33"/>
+                </a:solidFill>
+              </a:rPr>
+              <a:t>j</a:t>
+            </a:r>
+            <a:r>
+              <a:rPr lang="en-US" sz="2800" dirty="0">
+                <a:solidFill>
+                  <a:srgbClr val="33CC33"/>
+                </a:solidFill>
+              </a:rPr>
+              <a:t> + OPT(p(j))</a:t>
+            </a:r>
+            <a:r>
+              <a:rPr lang="en-US" sz="2800" dirty="0"/>
+              <a:t>, </a:t>
+            </a:r>
+            <a:r>
+              <a:rPr lang="en-US" sz="2800" dirty="0">
+                <a:solidFill>
+                  <a:srgbClr val="0070C0"/>
+                </a:solidFill>
+              </a:rPr>
+              <a:t>OPT(j-1)</a:t>
+            </a:r>
+            <a:r>
+              <a:rPr lang="en-US" sz="2800" dirty="0"/>
+              <a:t>)</a:t>
+            </a:r>
+          </a:p>
+          <a:p>
+            <a:pPr lvl="1"/>
+            <a:r>
+              <a:rPr lang="en-US" sz="2400" dirty="0"/>
+              <a:t>And OPT(0) = 0</a:t>
+            </a:r>
+          </a:p>
+          <a:p>
+            <a:r>
+              <a:rPr lang="en-US" sz="2800" dirty="0"/>
+              <a:t>This is similar in running time to the Fibonacci sequence</a:t>
+            </a:r>
+          </a:p>
+          <a:p>
+            <a:pPr lvl="1"/>
+            <a:r>
+              <a:rPr lang="en-US" sz="2400" dirty="0"/>
+              <a:t>And similarly exponential</a:t>
+            </a:r>
+          </a:p>
+          <a:p>
+            <a:r>
+              <a:rPr lang="en-US" sz="2800" dirty="0"/>
+              <a:t>Consider a simple example:</a:t>
+            </a:r>
+          </a:p>
+        </p:txBody>
+      </p:sp>
+      <p:pic>
+        <p:nvPicPr>
+          <p:cNvPr id="5" name="Picture 2" descr="C:\WINDOWS\Desktop\Oh_type\kleinberg_GIF_01to10\kleinberg_06F04.gif"/>
+          <p:cNvPicPr preferRelativeResize="0">
+            <a:picLocks noChangeAspect="1" noChangeArrowheads="1"/>
+          </p:cNvPicPr>
+          <p:nvPr>
+            <p:custDataLst>
+              <p:tags r:id="rId1"/>
+            </p:custDataLst>
+          </p:nvPr>
+        </p:nvPicPr>
+        <p:blipFill>
+          <a:blip r:embed="rId4"/>
+          <a:srcRect b="25991"/>
+          <a:stretch>
+            <a:fillRect/>
+          </a:stretch>
+        </p:blipFill>
+        <p:spPr bwMode="auto">
+          <a:xfrm>
+            <a:off x="2362200" y="4495800"/>
+            <a:ext cx="7467600" cy="2133600"/>
+          </a:xfrm>
+          <a:prstGeom prst="rect">
+            <a:avLst/>
+          </a:prstGeom>
+          <a:noFill/>
+          <a:ln w="9525">
+            <a:noFill/>
+            <a:miter lim="800000"/>
+            <a:headEnd/>
+            <a:tailEnd/>
+          </a:ln>
+          <a:effectLst/>
+        </p:spPr>
+      </p:pic>
+    </p:spTree>
+    <p:extLst>
+      <p:ext uri="{BB962C8B-B14F-4D97-AF65-F5344CB8AC3E}">
+        <p14:creationId xmlns:p14="http://schemas.microsoft.com/office/powerpoint/2010/main" val="1602685291"/>
+      </p:ext>
+    </p:extLst>
+  </p:cSld>
+  <p:clrMapOvr>
+    <a:masterClrMapping/>
+  </p:clrMapOvr>
+</p:sld>
+</file>
+
 <file path=ppt/slides/slide2.xml><?xml version="1.0" encoding="utf-8"?>
 <p:sld xmlns:a="http://schemas.openxmlformats.org/drawingml/2006/main" xmlns:r="http://schemas.openxmlformats.org/officeDocument/2006/relationships" xmlns:p="http://schemas.openxmlformats.org/presentationml/2006/main">
   <p:cSld>
@@ -5131,7 +6869,7 @@
             </a:ln>
             <a:extLst>
               <a:ext uri="{909E8E84-426E-40dd-AFC4-6F175D3DCCD1}">
-                <a14:hiddenFill xmlns="" xmlns:a14="http://schemas.microsoft.com/office/drawing/2010/main">
+                <a14:hiddenFill xmlns:a14="http://schemas.microsoft.com/office/drawing/2010/main" xmlns="">
                   <a:noFill/>
                 </a14:hiddenFill>
               </a:ext>
@@ -5172,7 +6910,7 @@
             </a:ln>
             <a:extLst>
               <a:ext uri="{909E8E84-426E-40dd-AFC4-6F175D3DCCD1}">
-                <a14:hiddenFill xmlns="" xmlns:a14="http://schemas.microsoft.com/office/drawing/2010/main">
+                <a14:hiddenFill xmlns:a14="http://schemas.microsoft.com/office/drawing/2010/main" xmlns="">
                   <a:noFill/>
                 </a14:hiddenFill>
               </a:ext>
@@ -5213,7 +6951,7 @@
             </a:ln>
             <a:extLst>
               <a:ext uri="{909E8E84-426E-40dd-AFC4-6F175D3DCCD1}">
-                <a14:hiddenFill xmlns="" xmlns:a14="http://schemas.microsoft.com/office/drawing/2010/main">
+                <a14:hiddenFill xmlns:a14="http://schemas.microsoft.com/office/drawing/2010/main" xmlns="">
                   <a:noFill/>
                 </a14:hiddenFill>
               </a:ext>
@@ -5254,7 +6992,7 @@
             </a:ln>
             <a:extLst>
               <a:ext uri="{909E8E84-426E-40dd-AFC4-6F175D3DCCD1}">
-                <a14:hiddenFill xmlns="" xmlns:a14="http://schemas.microsoft.com/office/drawing/2010/main">
+                <a14:hiddenFill xmlns:a14="http://schemas.microsoft.com/office/drawing/2010/main" xmlns="">
                   <a:noFill/>
                 </a14:hiddenFill>
               </a:ext>
@@ -5295,7 +7033,7 @@
             </a:ln>
             <a:extLst>
               <a:ext uri="{909E8E84-426E-40dd-AFC4-6F175D3DCCD1}">
-                <a14:hiddenFill xmlns="" xmlns:a14="http://schemas.microsoft.com/office/drawing/2010/main">
+                <a14:hiddenFill xmlns:a14="http://schemas.microsoft.com/office/drawing/2010/main" xmlns="">
                   <a:noFill/>
                 </a14:hiddenFill>
               </a:ext>
@@ -5336,7 +7074,7 @@
             </a:ln>
             <a:extLst>
               <a:ext uri="{909E8E84-426E-40dd-AFC4-6F175D3DCCD1}">
-                <a14:hiddenFill xmlns="" xmlns:a14="http://schemas.microsoft.com/office/drawing/2010/main">
+                <a14:hiddenFill xmlns:a14="http://schemas.microsoft.com/office/drawing/2010/main" xmlns="">
                   <a:noFill/>
                 </a14:hiddenFill>
               </a:ext>
@@ -5373,14 +7111,14 @@
           </a:ln>
           <a:extLst>
             <a:ext uri="{909E8E84-426E-40dd-AFC4-6F175D3DCCD1}">
-              <a14:hiddenFill xmlns="" xmlns:a14="http://schemas.microsoft.com/office/drawing/2010/main">
+              <a14:hiddenFill xmlns:a14="http://schemas.microsoft.com/office/drawing/2010/main" xmlns="">
                 <a:solidFill>
                   <a:srgbClr val="FFFFFF"/>
                 </a:solidFill>
               </a14:hiddenFill>
             </a:ext>
             <a:ext uri="{91240B29-F687-4f45-9708-019B960494DF}">
-              <a14:hiddenLine xmlns="" xmlns:a14="http://schemas.microsoft.com/office/drawing/2010/main" w="9525">
+              <a14:hiddenLine xmlns:a14="http://schemas.microsoft.com/office/drawing/2010/main" xmlns="" w="9525">
                 <a:solidFill>
                   <a:srgbClr val="000000"/>
                 </a:solidFill>
@@ -5500,14 +7238,14 @@
             </a:ln>
             <a:extLst>
               <a:ext uri="{909E8E84-426E-40dd-AFC4-6F175D3DCCD1}">
-                <a14:hiddenFill xmlns="" xmlns:a14="http://schemas.microsoft.com/office/drawing/2010/main">
+                <a14:hiddenFill xmlns:a14="http://schemas.microsoft.com/office/drawing/2010/main" xmlns="">
                   <a:solidFill>
                     <a:srgbClr val="FFFFFF"/>
                   </a:solidFill>
                 </a14:hiddenFill>
               </a:ext>
               <a:ext uri="{91240B29-F687-4f45-9708-019B960494DF}">
-                <a14:hiddenLine xmlns="" xmlns:a14="http://schemas.microsoft.com/office/drawing/2010/main" w="28575">
+                <a14:hiddenLine xmlns:a14="http://schemas.microsoft.com/office/drawing/2010/main" xmlns="" w="28575">
                   <a:solidFill>
                     <a:srgbClr val="000000"/>
                   </a:solidFill>
@@ -5665,14 +7403,14 @@
             </a:ln>
             <a:extLst>
               <a:ext uri="{909E8E84-426E-40dd-AFC4-6F175D3DCCD1}">
-                <a14:hiddenFill xmlns="" xmlns:a14="http://schemas.microsoft.com/office/drawing/2010/main">
+                <a14:hiddenFill xmlns:a14="http://schemas.microsoft.com/office/drawing/2010/main" xmlns="">
                   <a:solidFill>
                     <a:srgbClr val="FFFFFF"/>
                   </a:solidFill>
                 </a14:hiddenFill>
               </a:ext>
               <a:ext uri="{91240B29-F687-4f45-9708-019B960494DF}">
-                <a14:hiddenLine xmlns="" xmlns:a14="http://schemas.microsoft.com/office/drawing/2010/main" w="28575">
+                <a14:hiddenLine xmlns:a14="http://schemas.microsoft.com/office/drawing/2010/main" xmlns="" w="28575">
                   <a:solidFill>
                     <a:srgbClr val="000000"/>
                   </a:solidFill>
@@ -5830,14 +7568,14 @@
             </a:ln>
             <a:extLst>
               <a:ext uri="{909E8E84-426E-40dd-AFC4-6F175D3DCCD1}">
-                <a14:hiddenFill xmlns="" xmlns:a14="http://schemas.microsoft.com/office/drawing/2010/main">
+                <a14:hiddenFill xmlns:a14="http://schemas.microsoft.com/office/drawing/2010/main" xmlns="">
                   <a:solidFill>
                     <a:srgbClr val="FFFFFF"/>
                   </a:solidFill>
                 </a14:hiddenFill>
               </a:ext>
               <a:ext uri="{91240B29-F687-4f45-9708-019B960494DF}">
-                <a14:hiddenLine xmlns="" xmlns:a14="http://schemas.microsoft.com/office/drawing/2010/main" w="28575">
+                <a14:hiddenLine xmlns:a14="http://schemas.microsoft.com/office/drawing/2010/main" xmlns="" w="28575">
                   <a:solidFill>
                     <a:srgbClr val="000000"/>
                   </a:solidFill>
@@ -5995,14 +7733,14 @@
             </a:ln>
             <a:extLst>
               <a:ext uri="{909E8E84-426E-40dd-AFC4-6F175D3DCCD1}">
-                <a14:hiddenFill xmlns="" xmlns:a14="http://schemas.microsoft.com/office/drawing/2010/main">
+                <a14:hiddenFill xmlns:a14="http://schemas.microsoft.com/office/drawing/2010/main" xmlns="">
                   <a:solidFill>
                     <a:srgbClr val="FFFFFF"/>
                   </a:solidFill>
                 </a14:hiddenFill>
               </a:ext>
               <a:ext uri="{91240B29-F687-4f45-9708-019B960494DF}">
-                <a14:hiddenLine xmlns="" xmlns:a14="http://schemas.microsoft.com/office/drawing/2010/main" w="28575">
+                <a14:hiddenLine xmlns:a14="http://schemas.microsoft.com/office/drawing/2010/main" xmlns="" w="28575">
                   <a:solidFill>
                     <a:srgbClr val="000000"/>
                   </a:solidFill>
@@ -6160,14 +7898,14 @@
             </a:ln>
             <a:extLst>
               <a:ext uri="{909E8E84-426E-40dd-AFC4-6F175D3DCCD1}">
-                <a14:hiddenFill xmlns="" xmlns:a14="http://schemas.microsoft.com/office/drawing/2010/main">
+                <a14:hiddenFill xmlns:a14="http://schemas.microsoft.com/office/drawing/2010/main" xmlns="">
                   <a:solidFill>
                     <a:srgbClr val="FFFFFF"/>
                   </a:solidFill>
                 </a14:hiddenFill>
               </a:ext>
               <a:ext uri="{91240B29-F687-4f45-9708-019B960494DF}">
-                <a14:hiddenLine xmlns="" xmlns:a14="http://schemas.microsoft.com/office/drawing/2010/main" w="28575">
+                <a14:hiddenLine xmlns:a14="http://schemas.microsoft.com/office/drawing/2010/main" xmlns="" w="28575">
                   <a:solidFill>
                     <a:srgbClr val="000000"/>
                   </a:solidFill>
@@ -6325,14 +8063,14 @@
             </a:ln>
             <a:extLst>
               <a:ext uri="{909E8E84-426E-40dd-AFC4-6F175D3DCCD1}">
-                <a14:hiddenFill xmlns="" xmlns:a14="http://schemas.microsoft.com/office/drawing/2010/main">
+                <a14:hiddenFill xmlns:a14="http://schemas.microsoft.com/office/drawing/2010/main" xmlns="">
                   <a:solidFill>
                     <a:srgbClr val="FFFFFF"/>
                   </a:solidFill>
                 </a14:hiddenFill>
               </a:ext>
               <a:ext uri="{91240B29-F687-4f45-9708-019B960494DF}">
-                <a14:hiddenLine xmlns="" xmlns:a14="http://schemas.microsoft.com/office/drawing/2010/main" w="28575">
+                <a14:hiddenLine xmlns:a14="http://schemas.microsoft.com/office/drawing/2010/main" xmlns="" w="28575">
                   <a:solidFill>
                     <a:srgbClr val="000000"/>
                   </a:solidFill>
@@ -6685,6 +8423,620 @@
 </p:sld>
 </file>
 
+<file path=ppt/slides/slide20.xml><?xml version="1.0" encoding="utf-8"?>
+<p:sld xmlns:a="http://schemas.openxmlformats.org/drawingml/2006/main" xmlns:r="http://schemas.openxmlformats.org/officeDocument/2006/relationships" xmlns:p="http://schemas.openxmlformats.org/presentationml/2006/main">
+  <p:cSld>
+    <p:spTree>
+      <p:nvGrpSpPr>
+        <p:cNvPr id="1" name=""/>
+        <p:cNvGrpSpPr/>
+        <p:nvPr/>
+      </p:nvGrpSpPr>
+      <p:grpSpPr>
+        <a:xfrm>
+          <a:off x="0" y="0"/>
+          <a:ext cx="0" cy="0"/>
+          <a:chOff x="0" y="0"/>
+          <a:chExt cx="0" cy="0"/>
+        </a:xfrm>
+      </p:grpSpPr>
+      <p:sp>
+        <p:nvSpPr>
+          <p:cNvPr id="2" name="Title 1"/>
+          <p:cNvSpPr>
+            <a:spLocks noGrp="1"/>
+          </p:cNvSpPr>
+          <p:nvPr>
+            <p:ph type="title"/>
+          </p:nvPr>
+        </p:nvSpPr>
+        <p:spPr/>
+        <p:txBody>
+          <a:bodyPr/>
+          <a:lstStyle/>
+          <a:p>
+            <a:r>
+              <a:rPr lang="en-US"/>
+              <a:t>That example will take exponential time</a:t>
+            </a:r>
+            <a:endParaRPr lang="en-US" dirty="0"/>
+          </a:p>
+        </p:txBody>
+      </p:sp>
+      <p:sp>
+        <p:nvSpPr>
+          <p:cNvPr id="4" name="Slide Number Placeholder 3"/>
+          <p:cNvSpPr>
+            <a:spLocks noGrp="1"/>
+          </p:cNvSpPr>
+          <p:nvPr>
+            <p:ph type="sldNum" sz="quarter" idx="12"/>
+          </p:nvPr>
+        </p:nvSpPr>
+        <p:spPr/>
+        <p:txBody>
+          <a:bodyPr/>
+          <a:lstStyle/>
+          <a:p>
+            <a:fld id="{E17FA2C0-6470-4D29-AE9D-EE482BC8D0A3}" type="slidenum">
+              <a:rPr lang="en-US" smtClean="0"/>
+              <a:pPr/>
+              <a:t>20</a:t>
+            </a:fld>
+            <a:endParaRPr lang="en-US"/>
+          </a:p>
+        </p:txBody>
+      </p:sp>
+      <p:sp>
+        <p:nvSpPr>
+          <p:cNvPr id="9" name="Content Placeholder 8"/>
+          <p:cNvSpPr>
+            <a:spLocks noGrp="1"/>
+          </p:cNvSpPr>
+          <p:nvPr>
+            <p:ph sz="quarter" idx="1"/>
+          </p:nvPr>
+        </p:nvSpPr>
+        <p:spPr/>
+        <p:txBody>
+          <a:bodyPr/>
+          <a:lstStyle/>
+          <a:p>
+            <a:pPr algn="l"/>
+            <a:r>
+              <a:rPr lang="en-US" dirty="0"/>
+              <a:t>Notice that the </a:t>
+            </a:r>
+            <a:br>
+              <a:rPr lang="en-US" dirty="0"/>
+            </a:br>
+            <a:r>
+              <a:rPr lang="en-US" dirty="0"/>
+              <a:t>sub-problems are </a:t>
+            </a:r>
+            <a:br>
+              <a:rPr lang="en-US" dirty="0"/>
+            </a:br>
+            <a:r>
+              <a:rPr lang="en-US" dirty="0"/>
+              <a:t>being </a:t>
+            </a:r>
+            <a:br>
+              <a:rPr lang="en-US" dirty="0"/>
+            </a:br>
+            <a:r>
+              <a:rPr lang="en-US" dirty="0"/>
+              <a:t>re-computed </a:t>
+            </a:r>
+            <a:br>
+              <a:rPr lang="en-US" dirty="0"/>
+            </a:br>
+            <a:r>
+              <a:rPr lang="en-US" dirty="0"/>
+              <a:t>each time</a:t>
+            </a:r>
+          </a:p>
+        </p:txBody>
+      </p:sp>
+      <p:pic>
+        <p:nvPicPr>
+          <p:cNvPr id="5" name="Picture 2" descr="C:\WINDOWS\Desktop\Oh_type\kleinberg_GIF_01to10\kleinberg_06F03.gif"/>
+          <p:cNvPicPr preferRelativeResize="0">
+            <a:picLocks noChangeAspect="1" noChangeArrowheads="1"/>
+          </p:cNvPicPr>
+          <p:nvPr>
+            <p:custDataLst>
+              <p:tags r:id="rId1"/>
+            </p:custDataLst>
+          </p:nvPr>
+        </p:nvPicPr>
+        <p:blipFill>
+          <a:blip r:embed="rId3">
+            <a:clrChange>
+              <a:clrFrom>
+                <a:srgbClr val="FFFFFF"/>
+              </a:clrFrom>
+              <a:clrTo>
+                <a:srgbClr val="FFFFFF">
+                  <a:alpha val="0"/>
+                </a:srgbClr>
+              </a:clrTo>
+            </a:clrChange>
+          </a:blip>
+          <a:srcRect b="9957"/>
+          <a:stretch>
+            <a:fillRect/>
+          </a:stretch>
+        </p:blipFill>
+        <p:spPr bwMode="auto">
+          <a:xfrm>
+            <a:off x="3479800" y="1524000"/>
+            <a:ext cx="6959600" cy="4953000"/>
+          </a:xfrm>
+          <a:prstGeom prst="rect">
+            <a:avLst/>
+          </a:prstGeom>
+          <a:noFill/>
+          <a:ln w="9525">
+            <a:noFill/>
+            <a:miter lim="800000"/>
+            <a:headEnd/>
+            <a:tailEnd/>
+          </a:ln>
+          <a:effectLst/>
+        </p:spPr>
+      </p:pic>
+    </p:spTree>
+    <p:extLst>
+      <p:ext uri="{BB962C8B-B14F-4D97-AF65-F5344CB8AC3E}">
+        <p14:creationId xmlns:p14="http://schemas.microsoft.com/office/powerpoint/2010/main" val="1807638899"/>
+      </p:ext>
+    </p:extLst>
+  </p:cSld>
+  <p:clrMapOvr>
+    <a:masterClrMapping/>
+  </p:clrMapOvr>
+</p:sld>
+</file>
+
+<file path=ppt/slides/slide21.xml><?xml version="1.0" encoding="utf-8"?>
+<p:sld xmlns:a="http://schemas.openxmlformats.org/drawingml/2006/main" xmlns:r="http://schemas.openxmlformats.org/officeDocument/2006/relationships" xmlns:p="http://schemas.openxmlformats.org/presentationml/2006/main">
+  <p:cSld>
+    <p:spTree>
+      <p:nvGrpSpPr>
+        <p:cNvPr id="1" name=""/>
+        <p:cNvGrpSpPr/>
+        <p:nvPr/>
+      </p:nvGrpSpPr>
+      <p:grpSpPr>
+        <a:xfrm>
+          <a:off x="0" y="0"/>
+          <a:ext cx="0" cy="0"/>
+          <a:chOff x="0" y="0"/>
+          <a:chExt cx="0" cy="0"/>
+        </a:xfrm>
+      </p:grpSpPr>
+      <p:sp>
+        <p:nvSpPr>
+          <p:cNvPr id="2" name="Title 1"/>
+          <p:cNvSpPr>
+            <a:spLocks noGrp="1"/>
+          </p:cNvSpPr>
+          <p:nvPr>
+            <p:ph type="title"/>
+          </p:nvPr>
+        </p:nvSpPr>
+        <p:spPr/>
+        <p:txBody>
+          <a:bodyPr/>
+          <a:lstStyle/>
+          <a:p>
+            <a:r>
+              <a:rPr lang="en-US" dirty="0"/>
+              <a:t>Step 3!</a:t>
+            </a:r>
+          </a:p>
+        </p:txBody>
+      </p:sp>
+      <p:sp>
+        <p:nvSpPr>
+          <p:cNvPr id="3" name="Slide Number Placeholder 2"/>
+          <p:cNvSpPr>
+            <a:spLocks noGrp="1"/>
+          </p:cNvSpPr>
+          <p:nvPr>
+            <p:ph type="sldNum" sz="quarter" idx="12"/>
+          </p:nvPr>
+        </p:nvSpPr>
+        <p:spPr/>
+        <p:txBody>
+          <a:bodyPr/>
+          <a:lstStyle/>
+          <a:p>
+            <a:pPr>
+              <a:defRPr/>
+            </a:pPr>
+            <a:fld id="{E17FA2C0-6470-4D29-AE9D-EE482BC8D0A3}" type="slidenum">
+              <a:rPr lang="en-US" smtClean="0"/>
+              <a:pPr>
+                <a:defRPr/>
+              </a:pPr>
+              <a:t>21</a:t>
+            </a:fld>
+            <a:endParaRPr lang="en-US"/>
+          </a:p>
+        </p:txBody>
+      </p:sp>
+      <p:sp>
+        <p:nvSpPr>
+          <p:cNvPr id="4" name="Content Placeholder 3"/>
+          <p:cNvSpPr>
+            <a:spLocks noGrp="1"/>
+          </p:cNvSpPr>
+          <p:nvPr>
+            <p:ph sz="quarter" idx="1"/>
+          </p:nvPr>
+        </p:nvSpPr>
+        <p:spPr/>
+        <p:txBody>
+          <a:bodyPr/>
+          <a:lstStyle/>
+          <a:p>
+            <a:r>
+              <a:rPr lang="en-US" dirty="0"/>
+              <a:t>Formulate the data structure to look up </a:t>
+            </a:r>
+            <a:r>
+              <a:rPr lang="en-US" dirty="0" err="1"/>
+              <a:t>subproblems</a:t>
+            </a:r>
+            <a:r>
+              <a:rPr lang="en-US" dirty="0"/>
+              <a:t>.</a:t>
+            </a:r>
+          </a:p>
+          <a:p>
+            <a:endParaRPr lang="en-US" dirty="0"/>
+          </a:p>
+          <a:p>
+            <a:r>
+              <a:rPr lang="en-US" dirty="0"/>
+              <a:t>Pretty simple, define M[n]</a:t>
+            </a:r>
+          </a:p>
+          <a:p>
+            <a:endParaRPr lang="en-US" dirty="0"/>
+          </a:p>
+          <a:p>
+            <a:r>
+              <a:rPr lang="en-US" dirty="0"/>
+              <a:t>M[j] stores the solution to Opt(j)</a:t>
+            </a:r>
+          </a:p>
+        </p:txBody>
+      </p:sp>
+    </p:spTree>
+    <p:extLst>
+      <p:ext uri="{BB962C8B-B14F-4D97-AF65-F5344CB8AC3E}">
+        <p14:creationId xmlns:p14="http://schemas.microsoft.com/office/powerpoint/2010/main" val="3521458596"/>
+      </p:ext>
+    </p:extLst>
+  </p:cSld>
+  <p:clrMapOvr>
+    <a:masterClrMapping/>
+  </p:clrMapOvr>
+</p:sld>
+</file>
+
+<file path=ppt/slides/slide22.xml><?xml version="1.0" encoding="utf-8"?>
+<p:sld xmlns:a="http://schemas.openxmlformats.org/drawingml/2006/main" xmlns:r="http://schemas.openxmlformats.org/officeDocument/2006/relationships" xmlns:p="http://schemas.openxmlformats.org/presentationml/2006/main">
+  <p:cSld>
+    <p:spTree>
+      <p:nvGrpSpPr>
+        <p:cNvPr id="1" name=""/>
+        <p:cNvGrpSpPr/>
+        <p:nvPr/>
+      </p:nvGrpSpPr>
+      <p:grpSpPr>
+        <a:xfrm>
+          <a:off x="0" y="0"/>
+          <a:ext cx="0" cy="0"/>
+          <a:chOff x="0" y="0"/>
+          <a:chExt cx="0" cy="0"/>
+        </a:xfrm>
+      </p:grpSpPr>
+      <p:sp>
+        <p:nvSpPr>
+          <p:cNvPr id="2" name="Title 1"/>
+          <p:cNvSpPr>
+            <a:spLocks noGrp="1"/>
+          </p:cNvSpPr>
+          <p:nvPr>
+            <p:ph type="title"/>
+          </p:nvPr>
+        </p:nvSpPr>
+        <p:spPr/>
+        <p:txBody>
+          <a:bodyPr/>
+          <a:lstStyle/>
+          <a:p>
+            <a:r>
+              <a:rPr lang="en-US" dirty="0"/>
+              <a:t>So we add </a:t>
+            </a:r>
+            <a:r>
+              <a:rPr lang="en-US" dirty="0" err="1"/>
+              <a:t>memoization</a:t>
+            </a:r>
+            <a:r>
+              <a:rPr lang="en-US" dirty="0"/>
+              <a:t>…</a:t>
+            </a:r>
+          </a:p>
+        </p:txBody>
+      </p:sp>
+      <p:sp>
+        <p:nvSpPr>
+          <p:cNvPr id="4" name="Slide Number Placeholder 3"/>
+          <p:cNvSpPr>
+            <a:spLocks noGrp="1"/>
+          </p:cNvSpPr>
+          <p:nvPr>
+            <p:ph type="sldNum" sz="quarter" idx="12"/>
+          </p:nvPr>
+        </p:nvSpPr>
+        <p:spPr/>
+        <p:txBody>
+          <a:bodyPr/>
+          <a:lstStyle/>
+          <a:p>
+            <a:pPr>
+              <a:defRPr/>
+            </a:pPr>
+            <a:fld id="{E17FA2C0-6470-4D29-AE9D-EE482BC8D0A3}" type="slidenum">
+              <a:rPr lang="en-US" smtClean="0"/>
+              <a:pPr>
+                <a:defRPr/>
+              </a:pPr>
+              <a:t>22</a:t>
+            </a:fld>
+            <a:endParaRPr lang="en-US"/>
+          </a:p>
+        </p:txBody>
+      </p:sp>
+      <p:sp>
+        <p:nvSpPr>
+          <p:cNvPr id="3" name="Content Placeholder 2"/>
+          <p:cNvSpPr>
+            <a:spLocks noGrp="1"/>
+          </p:cNvSpPr>
+          <p:nvPr>
+            <p:ph sz="quarter" idx="1"/>
+          </p:nvPr>
+        </p:nvSpPr>
+        <p:spPr>
+          <a:xfrm>
+            <a:off x="609600" y="1600201"/>
+            <a:ext cx="10972800" cy="838200"/>
+          </a:xfrm>
+        </p:spPr>
+        <p:txBody>
+          <a:bodyPr/>
+          <a:lstStyle/>
+          <a:p>
+            <a:r>
+              <a:rPr lang="en-US" dirty="0"/>
+              <a:t>This runs in linear time</a:t>
+            </a:r>
+          </a:p>
+        </p:txBody>
+      </p:sp>
+      <p:pic>
+        <p:nvPicPr>
+          <p:cNvPr id="5" name="Picture 2" descr="C:\WINDOWS\Desktop\Oh_type\kleinberg_GIF_01to10\kleinberg_06F05.gif"/>
+          <p:cNvPicPr preferRelativeResize="0">
+            <a:picLocks noChangeAspect="1" noChangeArrowheads="1"/>
+          </p:cNvPicPr>
+          <p:nvPr>
+            <p:custDataLst>
+              <p:tags r:id="rId1"/>
+            </p:custDataLst>
+          </p:nvPr>
+        </p:nvPicPr>
+        <p:blipFill>
+          <a:blip r:embed="rId3"/>
+          <a:srcRect r="7563" b="20915"/>
+          <a:stretch>
+            <a:fillRect/>
+          </a:stretch>
+        </p:blipFill>
+        <p:spPr bwMode="auto">
+          <a:xfrm>
+            <a:off x="1705428" y="2720976"/>
+            <a:ext cx="8781143" cy="3352800"/>
+          </a:xfrm>
+          <a:prstGeom prst="rect">
+            <a:avLst/>
+          </a:prstGeom>
+          <a:noFill/>
+          <a:ln w="9525">
+            <a:noFill/>
+            <a:miter lim="800000"/>
+            <a:headEnd/>
+            <a:tailEnd/>
+          </a:ln>
+          <a:effectLst/>
+        </p:spPr>
+      </p:pic>
+    </p:spTree>
+    <p:extLst>
+      <p:ext uri="{BB962C8B-B14F-4D97-AF65-F5344CB8AC3E}">
+        <p14:creationId xmlns:p14="http://schemas.microsoft.com/office/powerpoint/2010/main" val="3828366628"/>
+      </p:ext>
+    </p:extLst>
+  </p:cSld>
+  <p:clrMapOvr>
+    <a:masterClrMapping/>
+  </p:clrMapOvr>
+</p:sld>
+</file>
+
+<file path=ppt/slides/slide23.xml><?xml version="1.0" encoding="utf-8"?>
+<p:sld xmlns:a="http://schemas.openxmlformats.org/drawingml/2006/main" xmlns:r="http://schemas.openxmlformats.org/officeDocument/2006/relationships" xmlns:p="http://schemas.openxmlformats.org/presentationml/2006/main">
+  <p:cSld>
+    <p:spTree>
+      <p:nvGrpSpPr>
+        <p:cNvPr id="1" name=""/>
+        <p:cNvGrpSpPr/>
+        <p:nvPr/>
+      </p:nvGrpSpPr>
+      <p:grpSpPr>
+        <a:xfrm>
+          <a:off x="0" y="0"/>
+          <a:ext cx="0" cy="0"/>
+          <a:chOff x="0" y="0"/>
+          <a:chExt cx="0" cy="0"/>
+        </a:xfrm>
+      </p:grpSpPr>
+      <p:sp>
+        <p:nvSpPr>
+          <p:cNvPr id="2" name="Title 1"/>
+          <p:cNvSpPr>
+            <a:spLocks noGrp="1"/>
+          </p:cNvSpPr>
+          <p:nvPr>
+            <p:ph type="title"/>
+          </p:nvPr>
+        </p:nvSpPr>
+        <p:spPr/>
+        <p:txBody>
+          <a:bodyPr/>
+          <a:lstStyle/>
+          <a:p>
+            <a:r>
+              <a:rPr lang="en-US" dirty="0"/>
+              <a:t>Computing the intervals</a:t>
+            </a:r>
+          </a:p>
+        </p:txBody>
+      </p:sp>
+      <p:sp>
+        <p:nvSpPr>
+          <p:cNvPr id="4" name="Slide Number Placeholder 3"/>
+          <p:cNvSpPr>
+            <a:spLocks noGrp="1"/>
+          </p:cNvSpPr>
+          <p:nvPr>
+            <p:ph type="sldNum" sz="quarter" idx="12"/>
+          </p:nvPr>
+        </p:nvSpPr>
+        <p:spPr/>
+        <p:txBody>
+          <a:bodyPr/>
+          <a:lstStyle/>
+          <a:p>
+            <a:pPr>
+              <a:defRPr/>
+            </a:pPr>
+            <a:fld id="{E17FA2C0-6470-4D29-AE9D-EE482BC8D0A3}" type="slidenum">
+              <a:rPr lang="en-US" smtClean="0"/>
+              <a:pPr>
+                <a:defRPr/>
+              </a:pPr>
+              <a:t>23</a:t>
+            </a:fld>
+            <a:endParaRPr lang="en-US"/>
+          </a:p>
+        </p:txBody>
+      </p:sp>
+      <p:sp>
+        <p:nvSpPr>
+          <p:cNvPr id="3" name="Content Placeholder 2"/>
+          <p:cNvSpPr>
+            <a:spLocks noGrp="1"/>
+          </p:cNvSpPr>
+          <p:nvPr>
+            <p:ph sz="quarter" idx="1"/>
+          </p:nvPr>
+        </p:nvSpPr>
+        <p:spPr/>
+        <p:txBody>
+          <a:bodyPr/>
+          <a:lstStyle/>
+          <a:p>
+            <a:r>
+              <a:rPr lang="en-US" dirty="0"/>
+              <a:t>The solution only gives us the final value</a:t>
+            </a:r>
+          </a:p>
+          <a:p>
+            <a:pPr lvl="1"/>
+            <a:r>
+              <a:rPr lang="en-US" dirty="0"/>
+              <a:t>Computing a sub-array each step would make it quadratic running time</a:t>
+            </a:r>
+          </a:p>
+          <a:p>
+            <a:r>
+              <a:rPr lang="en-US" dirty="0"/>
+              <a:t>To determine the intervals:</a:t>
+            </a:r>
+          </a:p>
+          <a:p>
+            <a:pPr lvl="1"/>
+            <a:r>
+              <a:rPr lang="en-US" dirty="0"/>
+              <a:t>If </a:t>
+            </a:r>
+            <a:r>
+              <a:rPr lang="en-US" dirty="0" err="1"/>
+              <a:t>v</a:t>
+            </a:r>
+            <a:r>
+              <a:rPr lang="en-US" baseline="-25000" dirty="0" err="1"/>
+              <a:t>j</a:t>
+            </a:r>
+            <a:r>
+              <a:rPr lang="en-US" dirty="0"/>
+              <a:t> + M[p(j)] ≥ M[j-1]</a:t>
+            </a:r>
+          </a:p>
+          <a:p>
+            <a:pPr lvl="2"/>
+            <a:r>
+              <a:rPr lang="en-US" dirty="0"/>
+              <a:t>Then j is part of the solution, and consider p(j)</a:t>
+            </a:r>
+          </a:p>
+          <a:p>
+            <a:pPr lvl="1"/>
+            <a:r>
+              <a:rPr lang="en-US" dirty="0"/>
+              <a:t>Else</a:t>
+            </a:r>
+          </a:p>
+          <a:p>
+            <a:pPr lvl="2"/>
+            <a:r>
+              <a:rPr lang="en-US" dirty="0"/>
+              <a:t>Then j is NOT part of the solution, and consider j-1</a:t>
+            </a:r>
+          </a:p>
+        </p:txBody>
+      </p:sp>
+    </p:spTree>
+    <p:extLst>
+      <p:ext uri="{BB962C8B-B14F-4D97-AF65-F5344CB8AC3E}">
+        <p14:creationId xmlns:p14="http://schemas.microsoft.com/office/powerpoint/2010/main" val="416512720"/>
+      </p:ext>
+    </p:extLst>
+  </p:cSld>
+  <p:clrMapOvr>
+    <a:masterClrMapping/>
+  </p:clrMapOvr>
+</p:sld>
+</file>
+
 <file path=ppt/slides/slide3.xml><?xml version="1.0" encoding="utf-8"?>
 <p:sld xmlns:a="http://schemas.openxmlformats.org/drawingml/2006/main" xmlns:r="http://schemas.openxmlformats.org/officeDocument/2006/relationships" xmlns:p="http://schemas.openxmlformats.org/presentationml/2006/main">
   <p:cSld>
@@ -7541,8 +9893,8 @@
           </a:p>
         </p:txBody>
       </p:sp>
-      <mc:AlternateContent xmlns:mc="http://schemas.openxmlformats.org/markup-compatibility/2006">
-        <mc:Choice xmlns:a14="http://schemas.microsoft.com/office/drawing/2010/main" Requires="a14">
+      <mc:AlternateContent xmlns:mc="http://schemas.openxmlformats.org/markup-compatibility/2006" xmlns:a14="http://schemas.microsoft.com/office/drawing/2010/main">
+        <mc:Choice Requires="a14">
           <p:sp>
             <p:nvSpPr>
               <p:cNvPr id="3" name="Content Placeholder 2"/>
@@ -7944,7 +10296,7 @@
             </p:txBody>
           </p:sp>
         </mc:Choice>
-        <mc:Fallback>
+        <mc:Fallback xmlns="">
           <p:sp>
             <p:nvSpPr>
               <p:cNvPr id="3" name="Content Placeholder 2"/>
@@ -8065,8 +10417,8 @@
           </a:p>
         </p:txBody>
       </p:sp>
-      <mc:AlternateContent xmlns:mc="http://schemas.openxmlformats.org/markup-compatibility/2006">
-        <mc:Choice xmlns:a14="http://schemas.microsoft.com/office/drawing/2010/main" Requires="a14">
+      <mc:AlternateContent xmlns:mc="http://schemas.openxmlformats.org/markup-compatibility/2006" xmlns:a14="http://schemas.microsoft.com/office/drawing/2010/main">
+        <mc:Choice Requires="a14">
           <p:sp>
             <p:nvSpPr>
               <p:cNvPr id="3" name="Content Placeholder 2"/>
@@ -8107,7 +10459,7 @@
                         <m:begChr m:val="|"/>
                         <m:endChr m:val="|"/>
                         <m:ctrlPr>
-                          <a:rPr lang="en-US" smtClean="0">
+                          <a:rPr lang="en-US" i="1" smtClean="0">
                             <a:latin typeface="Cambria Math" panose="02040503050406030204" pitchFamily="18" charset="0"/>
                           </a:rPr>
                         </m:ctrlPr>
@@ -8135,7 +10487,7 @@
                         <m:begChr m:val="|"/>
                         <m:endChr m:val="|"/>
                         <m:ctrlPr>
-                          <a:rPr lang="en-US" smtClean="0">
+                          <a:rPr lang="en-US" i="1" smtClean="0">
                             <a:latin typeface="Cambria Math" panose="02040503050406030204" pitchFamily="18" charset="0"/>
                           </a:rPr>
                         </m:ctrlPr>
@@ -8464,7 +10816,7 @@
             </p:txBody>
           </p:sp>
         </mc:Choice>
-        <mc:Fallback>
+        <mc:Fallback xmlns="">
           <p:sp>
             <p:nvSpPr>
               <p:cNvPr id="3" name="Content Placeholder 2"/>
@@ -8544,6 +10896,133 @@
     <a:masterClrMapping/>
   </p:clrMapOvr>
 </p:sld>
+</file>
+
+<file path=ppt/slides/slide9.xml><?xml version="1.0" encoding="utf-8"?>
+<p:sld xmlns:a="http://schemas.openxmlformats.org/drawingml/2006/main" xmlns:r="http://schemas.openxmlformats.org/officeDocument/2006/relationships" xmlns:p="http://schemas.openxmlformats.org/presentationml/2006/main">
+  <p:cSld>
+    <p:spTree>
+      <p:nvGrpSpPr>
+        <p:cNvPr id="1" name=""/>
+        <p:cNvGrpSpPr/>
+        <p:nvPr/>
+      </p:nvGrpSpPr>
+      <p:grpSpPr>
+        <a:xfrm>
+          <a:off x="0" y="0"/>
+          <a:ext cx="0" cy="0"/>
+          <a:chOff x="0" y="0"/>
+          <a:chExt cx="0" cy="0"/>
+        </a:xfrm>
+      </p:grpSpPr>
+      <p:sp>
+        <p:nvSpPr>
+          <p:cNvPr id="5" name="Title 4"/>
+          <p:cNvSpPr>
+            <a:spLocks noGrp="1"/>
+          </p:cNvSpPr>
+          <p:nvPr>
+            <p:ph type="title"/>
+          </p:nvPr>
+        </p:nvSpPr>
+        <p:spPr/>
+        <p:txBody>
+          <a:bodyPr/>
+          <a:lstStyle/>
+          <a:p>
+            <a:r>
+              <a:rPr lang="en-US" dirty="0"/>
+              <a:t>Weighted Interval Scheduling</a:t>
+            </a:r>
+          </a:p>
+        </p:txBody>
+      </p:sp>
+      <p:sp>
+        <p:nvSpPr>
+          <p:cNvPr id="6" name="Text Placeholder 5"/>
+          <p:cNvSpPr>
+            <a:spLocks noGrp="1"/>
+          </p:cNvSpPr>
+          <p:nvPr>
+            <p:ph type="body" idx="1"/>
+          </p:nvPr>
+        </p:nvSpPr>
+        <p:spPr/>
+        <p:txBody>
+          <a:bodyPr/>
+          <a:lstStyle/>
+          <a:p>
+            <a:r>
+              <a:rPr lang="en-US" dirty="0"/>
+              <a:t>Live Section (Apr. 5, 2021)</a:t>
+            </a:r>
+          </a:p>
+        </p:txBody>
+      </p:sp>
+      <p:sp>
+        <p:nvSpPr>
+          <p:cNvPr id="4" name="Slide Number Placeholder 3"/>
+          <p:cNvSpPr>
+            <a:spLocks noGrp="1"/>
+          </p:cNvSpPr>
+          <p:nvPr>
+            <p:ph type="sldNum" sz="quarter" idx="12"/>
+          </p:nvPr>
+        </p:nvSpPr>
+        <p:spPr/>
+        <p:txBody>
+          <a:bodyPr/>
+          <a:lstStyle/>
+          <a:p>
+            <a:pPr>
+              <a:defRPr/>
+            </a:pPr>
+            <a:fld id="{E17FA2C0-6470-4D29-AE9D-EE482BC8D0A3}" type="slidenum">
+              <a:rPr lang="en-US" smtClean="0"/>
+              <a:pPr>
+                <a:defRPr/>
+              </a:pPr>
+              <a:t>9</a:t>
+            </a:fld>
+            <a:endParaRPr lang="en-US"/>
+          </a:p>
+        </p:txBody>
+      </p:sp>
+    </p:spTree>
+    <p:extLst>
+      <p:ext uri="{BB962C8B-B14F-4D97-AF65-F5344CB8AC3E}">
+        <p14:creationId xmlns:p14="http://schemas.microsoft.com/office/powerpoint/2010/main" val="747914193"/>
+      </p:ext>
+    </p:extLst>
+  </p:cSld>
+  <p:clrMapOvr>
+    <a:masterClrMapping/>
+  </p:clrMapOvr>
+</p:sld>
+</file>
+
+<file path=ppt/tags/tag1.xml><?xml version="1.0" encoding="utf-8"?>
+<p:tagLst xmlns:a="http://schemas.openxmlformats.org/drawingml/2006/main" xmlns:r="http://schemas.openxmlformats.org/officeDocument/2006/relationships" xmlns:p="http://schemas.openxmlformats.org/presentationml/2006/main">
+  <p:tag name="IIW_TYPE_IMAGE" val="Text Box 3"/>
+</p:tagLst>
+</file>
+
+<file path=ppt/tags/tag2.xml><?xml version="1.0" encoding="utf-8"?>
+<p:tagLst xmlns:a="http://schemas.openxmlformats.org/drawingml/2006/main" xmlns:r="http://schemas.openxmlformats.org/officeDocument/2006/relationships" xmlns:p="http://schemas.openxmlformats.org/presentationml/2006/main">
+  <p:tag name="IIW_TYPE_IMAGE" val="Text Box 3"/>
+</p:tagLst>
+</file>
+
+<file path=ppt/tags/tag3.xml><?xml version="1.0" encoding="utf-8"?>
+<p:tagLst xmlns:a="http://schemas.openxmlformats.org/drawingml/2006/main" xmlns:r="http://schemas.openxmlformats.org/officeDocument/2006/relationships" xmlns:p="http://schemas.openxmlformats.org/presentationml/2006/main">
+  <p:tag name="IIW_TYPE_IMAGE" val="Text Box 3"/>
+</p:tagLst>
+</file>
+
+<file path=ppt/tags/tag4.xml><?xml version="1.0" encoding="utf-8"?>
+<p:tagLst xmlns:a="http://schemas.openxmlformats.org/drawingml/2006/main" xmlns:r="http://schemas.openxmlformats.org/officeDocument/2006/relationships" xmlns:p="http://schemas.openxmlformats.org/presentationml/2006/main">
+  <p:tag name="IIW_TYPE_IMAGE" val="Text Box 3"/>
+</p:tagLst>
 </file>
 
 <file path=ppt/theme/theme1.xml><?xml version="1.0" encoding="utf-8"?>

</xml_diff>